<commit_message>
fixed Risk Eval wording
</commit_message>
<xml_diff>
--- a/figures/fig1-workflow.pptx
+++ b/figures/fig1-workflow.pptx
@@ -1340,6 +1340,30 @@
           </pc:spChg>
         </pc:sldLayoutChg>
       </pc:sldMasterChg>
+    </pc:docChg>
+  </pc:docChgLst>
+  <pc:docChgLst>
+    <pc:chgData name="Truong, Kimberly (she/her/hers)" userId="925efed1-480b-4601-a542-5efebb98d46d" providerId="ADAL" clId="{8C2351D7-ABC9-448A-8649-757E848A3996}"/>
+    <pc:docChg chg="modSld">
+      <pc:chgData name="Truong, Kimberly (she/her/hers)" userId="925efed1-480b-4601-a542-5efebb98d46d" providerId="ADAL" clId="{8C2351D7-ABC9-448A-8649-757E848A3996}" dt="2024-08-21T18:38:32.327" v="52" actId="20577"/>
+      <pc:docMkLst>
+        <pc:docMk/>
+      </pc:docMkLst>
+      <pc:sldChg chg="modSp">
+        <pc:chgData name="Truong, Kimberly (she/her/hers)" userId="925efed1-480b-4601-a542-5efebb98d46d" providerId="ADAL" clId="{8C2351D7-ABC9-448A-8649-757E848A3996}" dt="2024-08-21T18:38:32.327" v="52" actId="20577"/>
+        <pc:sldMkLst>
+          <pc:docMk/>
+          <pc:sldMk cId="312177612" sldId="2969"/>
+        </pc:sldMkLst>
+        <pc:graphicFrameChg chg="mod">
+          <ac:chgData name="Truong, Kimberly (she/her/hers)" userId="925efed1-480b-4601-a542-5efebb98d46d" providerId="ADAL" clId="{8C2351D7-ABC9-448A-8649-757E848A3996}" dt="2024-08-21T18:38:32.327" v="52" actId="20577"/>
+          <ac:graphicFrameMkLst>
+            <pc:docMk/>
+            <pc:sldMk cId="312177612" sldId="2969"/>
+            <ac:graphicFrameMk id="24" creationId="{EFF69940-0D6D-5518-442B-DBCC36EF3D3C}"/>
+          </ac:graphicFrameMkLst>
+        </pc:graphicFrameChg>
+      </pc:sldChg>
     </pc:docChg>
   </pc:docChgLst>
 </pc:chgInfo>
@@ -2390,7 +2414,21 @@
               <a:latin typeface="Avenir Next LT Pro" panose="020B0504020202020204" pitchFamily="34" charset="0"/>
               <a:cs typeface="Arial" panose="020B0604020202020204" pitchFamily="34" charset="0"/>
             </a:rPr>
-            <a:t>Risk Evaluation</a:t>
+            <a:t>Targeted </a:t>
+          </a:r>
+          <a:r>
+            <a:rPr lang="en-US" b="0" dirty="0" err="1">
+              <a:latin typeface="Avenir Next LT Pro" panose="020B0504020202020204" pitchFamily="34" charset="0"/>
+              <a:cs typeface="Arial" panose="020B0604020202020204" pitchFamily="34" charset="0"/>
+            </a:rPr>
+            <a:t>bioactivity:exposure</a:t>
+          </a:r>
+          <a:r>
+            <a:rPr lang="en-US" b="0" dirty="0">
+              <a:latin typeface="Avenir Next LT Pro" panose="020B0504020202020204" pitchFamily="34" charset="0"/>
+              <a:cs typeface="Arial" panose="020B0604020202020204" pitchFamily="34" charset="0"/>
+            </a:rPr>
+            <a:t> ratios</a:t>
           </a:r>
         </a:p>
       </dgm:t>
@@ -2570,12 +2608,12 @@
         </a:fontRef>
       </dsp:style>
       <dsp:txBody>
-        <a:bodyPr spcFirstLastPara="0" vert="horz" wrap="square" lIns="76010" tIns="25337" rIns="25337" bIns="25337" numCol="1" spcCol="1270" anchor="ctr" anchorCtr="0">
+        <a:bodyPr spcFirstLastPara="0" vert="horz" wrap="square" lIns="52007" tIns="17336" rIns="17336" bIns="17336" numCol="1" spcCol="1270" anchor="ctr" anchorCtr="0">
           <a:noAutofit/>
         </a:bodyPr>
         <a:lstStyle/>
         <a:p>
-          <a:pPr marL="0" lvl="0" indent="0" algn="ctr" defTabSz="844550">
+          <a:pPr marL="0" lvl="0" indent="0" algn="ctr" defTabSz="577850">
             <a:lnSpc>
               <a:spcPct val="90000"/>
             </a:lnSpc>
@@ -2588,7 +2626,7 @@
             <a:buNone/>
           </a:pPr>
           <a:r>
-            <a:rPr lang="en-US" sz="1900" b="0" kern="1200" dirty="0">
+            <a:rPr lang="en-US" sz="1300" b="0" kern="1200" dirty="0">
               <a:latin typeface="Avenir Next LT Pro" panose="020B0504020202020204" pitchFamily="34" charset="0"/>
               <a:cs typeface="Arial" panose="020B0604020202020204" pitchFamily="34" charset="0"/>
             </a:rPr>
@@ -2646,12 +2684,12 @@
         </a:fontRef>
       </dsp:style>
       <dsp:txBody>
-        <a:bodyPr spcFirstLastPara="0" vert="horz" wrap="square" lIns="76010" tIns="25337" rIns="25337" bIns="25337" numCol="1" spcCol="1270" anchor="ctr" anchorCtr="0">
+        <a:bodyPr spcFirstLastPara="0" vert="horz" wrap="square" lIns="52007" tIns="17336" rIns="17336" bIns="17336" numCol="1" spcCol="1270" anchor="ctr" anchorCtr="0">
           <a:noAutofit/>
         </a:bodyPr>
         <a:lstStyle/>
         <a:p>
-          <a:pPr marL="0" lvl="0" indent="0" algn="ctr" defTabSz="844550">
+          <a:pPr marL="0" lvl="0" indent="0" algn="ctr" defTabSz="577850">
             <a:lnSpc>
               <a:spcPct val="90000"/>
             </a:lnSpc>
@@ -2664,7 +2702,7 @@
             <a:buNone/>
           </a:pPr>
           <a:r>
-            <a:rPr lang="en-US" sz="1900" b="0" kern="1200" dirty="0">
+            <a:rPr lang="en-US" sz="1300" b="0" kern="1200" dirty="0">
               <a:latin typeface="Avenir Next LT Pro" panose="020B0504020202020204" pitchFamily="34" charset="0"/>
               <a:cs typeface="Arial" panose="020B0604020202020204" pitchFamily="34" charset="0"/>
             </a:rPr>
@@ -2722,12 +2760,12 @@
         </a:fontRef>
       </dsp:style>
       <dsp:txBody>
-        <a:bodyPr spcFirstLastPara="0" vert="horz" wrap="square" lIns="76010" tIns="25337" rIns="25337" bIns="25337" numCol="1" spcCol="1270" anchor="ctr" anchorCtr="0">
+        <a:bodyPr spcFirstLastPara="0" vert="horz" wrap="square" lIns="52007" tIns="17336" rIns="17336" bIns="17336" numCol="1" spcCol="1270" anchor="ctr" anchorCtr="0">
           <a:noAutofit/>
         </a:bodyPr>
         <a:lstStyle/>
         <a:p>
-          <a:pPr marL="0" lvl="0" indent="0" algn="ctr" defTabSz="844550">
+          <a:pPr marL="0" lvl="0" indent="0" algn="ctr" defTabSz="577850">
             <a:lnSpc>
               <a:spcPct val="90000"/>
             </a:lnSpc>
@@ -2740,7 +2778,7 @@
             <a:buNone/>
           </a:pPr>
           <a:r>
-            <a:rPr lang="en-US" sz="1900" b="0" kern="1200" dirty="0">
+            <a:rPr lang="en-US" sz="1300" b="0" kern="1200" dirty="0">
               <a:latin typeface="Avenir Next LT Pro" panose="020B0504020202020204" pitchFamily="34" charset="0"/>
               <a:cs typeface="Arial" panose="020B0604020202020204" pitchFamily="34" charset="0"/>
             </a:rPr>
@@ -2798,12 +2836,12 @@
         </a:fontRef>
       </dsp:style>
       <dsp:txBody>
-        <a:bodyPr spcFirstLastPara="0" vert="horz" wrap="square" lIns="76010" tIns="25337" rIns="25337" bIns="25337" numCol="1" spcCol="1270" anchor="ctr" anchorCtr="0">
+        <a:bodyPr spcFirstLastPara="0" vert="horz" wrap="square" lIns="52007" tIns="17336" rIns="17336" bIns="17336" numCol="1" spcCol="1270" anchor="ctr" anchorCtr="0">
           <a:noAutofit/>
         </a:bodyPr>
         <a:lstStyle/>
         <a:p>
-          <a:pPr marL="0" lvl="0" indent="0" algn="ctr" defTabSz="844550">
+          <a:pPr marL="0" lvl="0" indent="0" algn="ctr" defTabSz="577850">
             <a:lnSpc>
               <a:spcPct val="90000"/>
             </a:lnSpc>
@@ -2816,11 +2854,25 @@
             <a:buNone/>
           </a:pPr>
           <a:r>
-            <a:rPr lang="en-US" sz="1900" b="0" kern="1200" dirty="0">
+            <a:rPr lang="en-US" sz="1300" b="0" kern="1200" dirty="0">
               <a:latin typeface="Avenir Next LT Pro" panose="020B0504020202020204" pitchFamily="34" charset="0"/>
               <a:cs typeface="Arial" panose="020B0604020202020204" pitchFamily="34" charset="0"/>
             </a:rPr>
-            <a:t>Risk Evaluation</a:t>
+            <a:t>Targeted </a:t>
+          </a:r>
+          <a:r>
+            <a:rPr lang="en-US" sz="1300" b="0" kern="1200" dirty="0" err="1">
+              <a:latin typeface="Avenir Next LT Pro" panose="020B0504020202020204" pitchFamily="34" charset="0"/>
+              <a:cs typeface="Arial" panose="020B0604020202020204" pitchFamily="34" charset="0"/>
+            </a:rPr>
+            <a:t>bioactivity:exposure</a:t>
+          </a:r>
+          <a:r>
+            <a:rPr lang="en-US" sz="1300" b="0" kern="1200" dirty="0">
+              <a:latin typeface="Avenir Next LT Pro" panose="020B0504020202020204" pitchFamily="34" charset="0"/>
+              <a:cs typeface="Arial" panose="020B0604020202020204" pitchFamily="34" charset="0"/>
+            </a:rPr>
+            <a:t> ratios</a:t>
           </a:r>
         </a:p>
       </dsp:txBody>
@@ -4232,7 +4284,7 @@
           <a:p>
             <a:fld id="{CF3D3CB6-AF3F-41A8-820D-FF52D5A0F9BD}" type="datetimeFigureOut">
               <a:rPr lang="en-US" smtClean="0"/>
-              <a:t>4/16/2024</a:t>
+              <a:t>8/21/2024</a:t>
             </a:fld>
             <a:endParaRPr lang="en-US"/>
           </a:p>
@@ -4735,7 +4787,7 @@
           <a:p>
             <a:fld id="{5445729E-DEA5-4458-8279-F005B7149335}" type="datetimeFigureOut">
               <a:rPr lang="en-US" smtClean="0"/>
-              <a:t>4/16/2024</a:t>
+              <a:t>8/21/2024</a:t>
             </a:fld>
             <a:endParaRPr lang="en-US"/>
           </a:p>
@@ -4933,7 +4985,7 @@
           <a:p>
             <a:fld id="{5445729E-DEA5-4458-8279-F005B7149335}" type="datetimeFigureOut">
               <a:rPr lang="en-US" smtClean="0"/>
-              <a:t>4/16/2024</a:t>
+              <a:t>8/21/2024</a:t>
             </a:fld>
             <a:endParaRPr lang="en-US"/>
           </a:p>
@@ -5141,7 +5193,7 @@
           <a:p>
             <a:fld id="{5445729E-DEA5-4458-8279-F005B7149335}" type="datetimeFigureOut">
               <a:rPr lang="en-US" smtClean="0"/>
-              <a:t>4/16/2024</a:t>
+              <a:t>8/21/2024</a:t>
             </a:fld>
             <a:endParaRPr lang="en-US"/>
           </a:p>
@@ -5339,7 +5391,7 @@
           <a:p>
             <a:fld id="{5445729E-DEA5-4458-8279-F005B7149335}" type="datetimeFigureOut">
               <a:rPr lang="en-US" smtClean="0"/>
-              <a:t>4/16/2024</a:t>
+              <a:t>8/21/2024</a:t>
             </a:fld>
             <a:endParaRPr lang="en-US"/>
           </a:p>
@@ -5614,7 +5666,7 @@
           <a:p>
             <a:fld id="{5445729E-DEA5-4458-8279-F005B7149335}" type="datetimeFigureOut">
               <a:rPr lang="en-US" smtClean="0"/>
-              <a:t>4/16/2024</a:t>
+              <a:t>8/21/2024</a:t>
             </a:fld>
             <a:endParaRPr lang="en-US"/>
           </a:p>
@@ -5879,7 +5931,7 @@
           <a:p>
             <a:fld id="{5445729E-DEA5-4458-8279-F005B7149335}" type="datetimeFigureOut">
               <a:rPr lang="en-US" smtClean="0"/>
-              <a:t>4/16/2024</a:t>
+              <a:t>8/21/2024</a:t>
             </a:fld>
             <a:endParaRPr lang="en-US"/>
           </a:p>
@@ -6291,7 +6343,7 @@
           <a:p>
             <a:fld id="{5445729E-DEA5-4458-8279-F005B7149335}" type="datetimeFigureOut">
               <a:rPr lang="en-US" smtClean="0"/>
-              <a:t>4/16/2024</a:t>
+              <a:t>8/21/2024</a:t>
             </a:fld>
             <a:endParaRPr lang="en-US"/>
           </a:p>
@@ -6432,7 +6484,7 @@
           <a:p>
             <a:fld id="{5445729E-DEA5-4458-8279-F005B7149335}" type="datetimeFigureOut">
               <a:rPr lang="en-US" smtClean="0"/>
-              <a:t>4/16/2024</a:t>
+              <a:t>8/21/2024</a:t>
             </a:fld>
             <a:endParaRPr lang="en-US"/>
           </a:p>
@@ -6545,7 +6597,7 @@
           <a:p>
             <a:fld id="{5445729E-DEA5-4458-8279-F005B7149335}" type="datetimeFigureOut">
               <a:rPr lang="en-US" smtClean="0"/>
-              <a:t>4/16/2024</a:t>
+              <a:t>8/21/2024</a:t>
             </a:fld>
             <a:endParaRPr lang="en-US"/>
           </a:p>
@@ -6856,7 +6908,7 @@
           <a:p>
             <a:fld id="{5445729E-DEA5-4458-8279-F005B7149335}" type="datetimeFigureOut">
               <a:rPr lang="en-US" smtClean="0"/>
-              <a:t>4/16/2024</a:t>
+              <a:t>8/21/2024</a:t>
             </a:fld>
             <a:endParaRPr lang="en-US"/>
           </a:p>
@@ -7144,7 +7196,7 @@
           <a:p>
             <a:fld id="{5445729E-DEA5-4458-8279-F005B7149335}" type="datetimeFigureOut">
               <a:rPr lang="en-US" smtClean="0"/>
-              <a:t>4/16/2024</a:t>
+              <a:t>8/21/2024</a:t>
             </a:fld>
             <a:endParaRPr lang="en-US"/>
           </a:p>
@@ -7385,7 +7437,7 @@
           <a:p>
             <a:fld id="{5445729E-DEA5-4458-8279-F005B7149335}" type="datetimeFigureOut">
               <a:rPr lang="en-US" smtClean="0"/>
-              <a:t>4/16/2024</a:t>
+              <a:t>8/21/2024</a:t>
             </a:fld>
             <a:endParaRPr lang="en-US"/>
           </a:p>
@@ -7862,7 +7914,7 @@
             <p:ph idx="1"/>
             <p:extLst>
               <p:ext uri="{D42A27DB-BD31-4B8C-83A1-F6EECF244321}">
-                <p14:modId xmlns:p14="http://schemas.microsoft.com/office/powerpoint/2010/main" val="1559198106"/>
+                <p14:modId xmlns:p14="http://schemas.microsoft.com/office/powerpoint/2010/main" val="534792687"/>
               </p:ext>
             </p:extLst>
           </p:nvPr>

</xml_diff>

<commit_message>
make heading font size bigger
</commit_message>
<xml_diff>
--- a/figures/fig1-workflow.pptx
+++ b/figures/fig1-workflow.pptx
@@ -1345,24 +1345,48 @@
   <pc:docChgLst>
     <pc:chgData name="Truong, Kimberly (she/her/hers)" userId="925efed1-480b-4601-a542-5efebb98d46d" providerId="ADAL" clId="{8C2351D7-ABC9-448A-8649-757E848A3996}"/>
     <pc:docChg chg="modSld">
-      <pc:chgData name="Truong, Kimberly (she/her/hers)" userId="925efed1-480b-4601-a542-5efebb98d46d" providerId="ADAL" clId="{8C2351D7-ABC9-448A-8649-757E848A3996}" dt="2024-08-21T18:38:32.327" v="52" actId="20577"/>
+      <pc:chgData name="Truong, Kimberly (she/her/hers)" userId="925efed1-480b-4601-a542-5efebb98d46d" providerId="ADAL" clId="{8C2351D7-ABC9-448A-8649-757E848A3996}" dt="2024-08-21T20:45:26.489" v="74" actId="1038"/>
       <pc:docMkLst>
         <pc:docMk/>
       </pc:docMkLst>
-      <pc:sldChg chg="modSp">
-        <pc:chgData name="Truong, Kimberly (she/her/hers)" userId="925efed1-480b-4601-a542-5efebb98d46d" providerId="ADAL" clId="{8C2351D7-ABC9-448A-8649-757E848A3996}" dt="2024-08-21T18:38:32.327" v="52" actId="20577"/>
+      <pc:sldChg chg="modSp mod">
+        <pc:chgData name="Truong, Kimberly (she/her/hers)" userId="925efed1-480b-4601-a542-5efebb98d46d" providerId="ADAL" clId="{8C2351D7-ABC9-448A-8649-757E848A3996}" dt="2024-08-21T20:45:26.489" v="74" actId="1038"/>
         <pc:sldMkLst>
           <pc:docMk/>
           <pc:sldMk cId="312177612" sldId="2969"/>
         </pc:sldMkLst>
-        <pc:graphicFrameChg chg="mod">
-          <ac:chgData name="Truong, Kimberly (she/her/hers)" userId="925efed1-480b-4601-a542-5efebb98d46d" providerId="ADAL" clId="{8C2351D7-ABC9-448A-8649-757E848A3996}" dt="2024-08-21T18:38:32.327" v="52" actId="20577"/>
+        <pc:graphicFrameChg chg="mod modGraphic">
+          <ac:chgData name="Truong, Kimberly (she/her/hers)" userId="925efed1-480b-4601-a542-5efebb98d46d" providerId="ADAL" clId="{8C2351D7-ABC9-448A-8649-757E848A3996}" dt="2024-08-21T20:43:09.889" v="67" actId="1037"/>
           <ac:graphicFrameMkLst>
             <pc:docMk/>
             <pc:sldMk cId="312177612" sldId="2969"/>
             <ac:graphicFrameMk id="24" creationId="{EFF69940-0D6D-5518-442B-DBCC36EF3D3C}"/>
           </ac:graphicFrameMkLst>
         </pc:graphicFrameChg>
+        <pc:cxnChg chg="mod">
+          <ac:chgData name="Truong, Kimberly (she/her/hers)" userId="925efed1-480b-4601-a542-5efebb98d46d" providerId="ADAL" clId="{8C2351D7-ABC9-448A-8649-757E848A3996}" dt="2024-08-21T20:45:26.489" v="74" actId="1038"/>
+          <ac:cxnSpMkLst>
+            <pc:docMk/>
+            <pc:sldMk cId="312177612" sldId="2969"/>
+            <ac:cxnSpMk id="27" creationId="{38C2D6F6-3A28-4662-00C5-DC1BAB7FDF85}"/>
+          </ac:cxnSpMkLst>
+        </pc:cxnChg>
+        <pc:cxnChg chg="mod">
+          <ac:chgData name="Truong, Kimberly (she/her/hers)" userId="925efed1-480b-4601-a542-5efebb98d46d" providerId="ADAL" clId="{8C2351D7-ABC9-448A-8649-757E848A3996}" dt="2024-08-21T20:45:14.727" v="72" actId="554"/>
+          <ac:cxnSpMkLst>
+            <pc:docMk/>
+            <pc:sldMk cId="312177612" sldId="2969"/>
+            <ac:cxnSpMk id="54" creationId="{3BBF8B0A-2E95-52A1-961C-83528AB8C482}"/>
+          </ac:cxnSpMkLst>
+        </pc:cxnChg>
+        <pc:cxnChg chg="mod">
+          <ac:chgData name="Truong, Kimberly (she/her/hers)" userId="925efed1-480b-4601-a542-5efebb98d46d" providerId="ADAL" clId="{8C2351D7-ABC9-448A-8649-757E848A3996}" dt="2024-08-21T20:45:14.727" v="72" actId="554"/>
+          <ac:cxnSpMkLst>
+            <pc:docMk/>
+            <pc:sldMk cId="312177612" sldId="2969"/>
+            <ac:cxnSpMk id="55" creationId="{3B418017-20B6-193A-A4DE-4BDCD4EBDC26}"/>
+          </ac:cxnSpMkLst>
+        </pc:cxnChg>
       </pc:sldChg>
     </pc:docChg>
   </pc:docChgLst>
@@ -2252,7 +2276,7 @@
       <dgm:spPr/>
     </dgm:pt>
     <dgm:pt modelId="{DA375C72-9E17-40B9-B1F9-4AF75F123C9B}">
-      <dgm:prSet phldrT="[Text]"/>
+      <dgm:prSet phldrT="[Text]" custT="1"/>
       <dgm:spPr>
         <a:solidFill>
           <a:srgbClr val="A4C0E3"/>
@@ -2263,7 +2287,7 @@
         <a:lstStyle/>
         <a:p>
           <a:r>
-            <a:rPr lang="en-US" b="0" dirty="0">
+            <a:rPr lang="en-US" sz="1400" b="0" dirty="0">
               <a:latin typeface="Avenir Next LT Pro" panose="020B0504020202020204" pitchFamily="34" charset="0"/>
               <a:cs typeface="Arial" panose="020B0604020202020204" pitchFamily="34" charset="0"/>
             </a:rPr>
@@ -2279,7 +2303,7 @@
         <a:bodyPr/>
         <a:lstStyle/>
         <a:p>
-          <a:endParaRPr lang="en-US" b="0">
+          <a:endParaRPr lang="en-US" sz="2000" b="0">
             <a:latin typeface="Avenir Next LT Pro" panose="020B0504020202020204" pitchFamily="34" charset="0"/>
             <a:cs typeface="Arial" panose="020B0604020202020204" pitchFamily="34" charset="0"/>
           </a:endParaRPr>
@@ -2293,7 +2317,7 @@
         <a:bodyPr/>
         <a:lstStyle/>
         <a:p>
-          <a:endParaRPr lang="en-US" b="0">
+          <a:endParaRPr lang="en-US" sz="2000" b="0">
             <a:latin typeface="Avenir Next LT Pro" panose="020B0504020202020204" pitchFamily="34" charset="0"/>
             <a:cs typeface="Arial" panose="020B0604020202020204" pitchFamily="34" charset="0"/>
           </a:endParaRPr>
@@ -2301,7 +2325,7 @@
       </dgm:t>
     </dgm:pt>
     <dgm:pt modelId="{4EAFDE17-8100-4432-86D3-36F2806EB45B}">
-      <dgm:prSet phldrT="[Text]"/>
+      <dgm:prSet phldrT="[Text]" custT="1"/>
       <dgm:spPr>
         <a:solidFill>
           <a:srgbClr val="88AED8"/>
@@ -2312,7 +2336,7 @@
         <a:lstStyle/>
         <a:p>
           <a:r>
-            <a:rPr lang="en-US" b="0" dirty="0">
+            <a:rPr lang="en-US" sz="1400" b="0" dirty="0">
               <a:latin typeface="Avenir Next LT Pro" panose="020B0504020202020204" pitchFamily="34" charset="0"/>
               <a:cs typeface="Arial" panose="020B0604020202020204" pitchFamily="34" charset="0"/>
             </a:rPr>
@@ -2328,7 +2352,7 @@
         <a:bodyPr/>
         <a:lstStyle/>
         <a:p>
-          <a:endParaRPr lang="en-US" b="0">
+          <a:endParaRPr lang="en-US" sz="2000" b="0">
             <a:latin typeface="Avenir Next LT Pro" panose="020B0504020202020204" pitchFamily="34" charset="0"/>
             <a:cs typeface="Arial" panose="020B0604020202020204" pitchFamily="34" charset="0"/>
           </a:endParaRPr>
@@ -2342,7 +2366,7 @@
         <a:bodyPr/>
         <a:lstStyle/>
         <a:p>
-          <a:endParaRPr lang="en-US" b="0">
+          <a:endParaRPr lang="en-US" sz="2000" b="0">
             <a:latin typeface="Avenir Next LT Pro" panose="020B0504020202020204" pitchFamily="34" charset="0"/>
             <a:cs typeface="Arial" panose="020B0604020202020204" pitchFamily="34" charset="0"/>
           </a:endParaRPr>
@@ -2350,7 +2374,7 @@
       </dgm:t>
     </dgm:pt>
     <dgm:pt modelId="{4084CD10-640C-48D4-938D-E9A342D6DA05}">
-      <dgm:prSet phldrT="[Text]"/>
+      <dgm:prSet phldrT="[Text]" custT="1"/>
       <dgm:spPr>
         <a:solidFill>
           <a:srgbClr val="6D9DCD"/>
@@ -2361,7 +2385,7 @@
         <a:lstStyle/>
         <a:p>
           <a:r>
-            <a:rPr lang="en-US" b="0" dirty="0">
+            <a:rPr lang="en-US" sz="1400" b="0" dirty="0">
               <a:latin typeface="Avenir Next LT Pro" panose="020B0504020202020204" pitchFamily="34" charset="0"/>
               <a:cs typeface="Arial" panose="020B0604020202020204" pitchFamily="34" charset="0"/>
             </a:rPr>
@@ -2377,7 +2401,7 @@
         <a:bodyPr/>
         <a:lstStyle/>
         <a:p>
-          <a:endParaRPr lang="en-US" b="0">
+          <a:endParaRPr lang="en-US" sz="2000" b="0">
             <a:latin typeface="Avenir Next LT Pro" panose="020B0504020202020204" pitchFamily="34" charset="0"/>
             <a:cs typeface="Arial" panose="020B0604020202020204" pitchFamily="34" charset="0"/>
           </a:endParaRPr>
@@ -2391,7 +2415,7 @@
         <a:bodyPr/>
         <a:lstStyle/>
         <a:p>
-          <a:endParaRPr lang="en-US" b="0">
+          <a:endParaRPr lang="en-US" sz="2000" b="0">
             <a:latin typeface="Avenir Next LT Pro" panose="020B0504020202020204" pitchFamily="34" charset="0"/>
             <a:cs typeface="Arial" panose="020B0604020202020204" pitchFamily="34" charset="0"/>
           </a:endParaRPr>
@@ -2399,7 +2423,7 @@
       </dgm:t>
     </dgm:pt>
     <dgm:pt modelId="{7895EE14-1759-47C8-BE4B-302E464FCCBE}">
-      <dgm:prSet/>
+      <dgm:prSet custT="1"/>
       <dgm:spPr>
         <a:solidFill>
           <a:srgbClr val="528CC1"/>
@@ -2410,21 +2434,21 @@
         <a:lstStyle/>
         <a:p>
           <a:r>
-            <a:rPr lang="en-US" b="0" dirty="0">
+            <a:rPr lang="en-US" sz="1400" b="0" dirty="0">
               <a:latin typeface="Avenir Next LT Pro" panose="020B0504020202020204" pitchFamily="34" charset="0"/>
               <a:cs typeface="Arial" panose="020B0604020202020204" pitchFamily="34" charset="0"/>
             </a:rPr>
             <a:t>Targeted </a:t>
           </a:r>
           <a:r>
-            <a:rPr lang="en-US" b="0" dirty="0" err="1">
+            <a:rPr lang="en-US" sz="1400" b="0" dirty="0" err="1">
               <a:latin typeface="Avenir Next LT Pro" panose="020B0504020202020204" pitchFamily="34" charset="0"/>
               <a:cs typeface="Arial" panose="020B0604020202020204" pitchFamily="34" charset="0"/>
             </a:rPr>
             <a:t>bioactivity:exposure</a:t>
           </a:r>
           <a:r>
-            <a:rPr lang="en-US" b="0" dirty="0">
+            <a:rPr lang="en-US" sz="1400" b="0" dirty="0">
               <a:latin typeface="Avenir Next LT Pro" panose="020B0504020202020204" pitchFamily="34" charset="0"/>
               <a:cs typeface="Arial" panose="020B0604020202020204" pitchFamily="34" charset="0"/>
             </a:rPr>
@@ -2440,7 +2464,7 @@
         <a:bodyPr/>
         <a:lstStyle/>
         <a:p>
-          <a:endParaRPr lang="en-US" b="0">
+          <a:endParaRPr lang="en-US" sz="2000" b="0">
             <a:latin typeface="Avenir Next LT Pro" panose="020B0504020202020204" pitchFamily="34" charset="0"/>
             <a:cs typeface="Arial" panose="020B0604020202020204" pitchFamily="34" charset="0"/>
           </a:endParaRPr>
@@ -2454,7 +2478,7 @@
         <a:bodyPr/>
         <a:lstStyle/>
         <a:p>
-          <a:endParaRPr lang="en-US" b="0">
+          <a:endParaRPr lang="en-US" sz="2000" b="0">
             <a:latin typeface="Avenir Next LT Pro" panose="020B0504020202020204" pitchFamily="34" charset="0"/>
             <a:cs typeface="Arial" panose="020B0604020202020204" pitchFamily="34" charset="0"/>
           </a:endParaRPr>
@@ -2570,8 +2594,8 @@
       </dsp:nvSpPr>
       <dsp:spPr>
         <a:xfrm>
-          <a:off x="4877" y="1607785"/>
-          <a:ext cx="2839417" cy="1135766"/>
+          <a:off x="4948" y="1599598"/>
+          <a:ext cx="2880350" cy="1152140"/>
         </a:xfrm>
         <a:prstGeom prst="chevron">
           <a:avLst/>
@@ -2608,12 +2632,12 @@
         </a:fontRef>
       </dsp:style>
       <dsp:txBody>
-        <a:bodyPr spcFirstLastPara="0" vert="horz" wrap="square" lIns="52007" tIns="17336" rIns="17336" bIns="17336" numCol="1" spcCol="1270" anchor="ctr" anchorCtr="0">
+        <a:bodyPr spcFirstLastPara="0" vert="horz" wrap="square" lIns="56007" tIns="18669" rIns="18669" bIns="18669" numCol="1" spcCol="1270" anchor="ctr" anchorCtr="0">
           <a:noAutofit/>
         </a:bodyPr>
         <a:lstStyle/>
         <a:p>
-          <a:pPr marL="0" lvl="0" indent="0" algn="ctr" defTabSz="577850">
+          <a:pPr marL="0" lvl="0" indent="0" algn="ctr" defTabSz="622300">
             <a:lnSpc>
               <a:spcPct val="90000"/>
             </a:lnSpc>
@@ -2626,7 +2650,7 @@
             <a:buNone/>
           </a:pPr>
           <a:r>
-            <a:rPr lang="en-US" sz="1300" b="0" kern="1200" dirty="0">
+            <a:rPr lang="en-US" sz="1400" b="0" kern="1200" dirty="0">
               <a:latin typeface="Avenir Next LT Pro" panose="020B0504020202020204" pitchFamily="34" charset="0"/>
               <a:cs typeface="Arial" panose="020B0604020202020204" pitchFamily="34" charset="0"/>
             </a:rPr>
@@ -2635,8 +2659,8 @@
         </a:p>
       </dsp:txBody>
       <dsp:txXfrm>
-        <a:off x="572760" y="1607785"/>
-        <a:ext cx="1703651" cy="1135766"/>
+        <a:off x="581018" y="1599598"/>
+        <a:ext cx="1728210" cy="1152140"/>
       </dsp:txXfrm>
     </dsp:sp>
     <dsp:sp modelId="{1FC7B2B6-C892-4A02-A815-17E64CDB0E9F}">
@@ -2646,8 +2670,8 @@
       </dsp:nvSpPr>
       <dsp:spPr>
         <a:xfrm>
-          <a:off x="2560353" y="1607785"/>
-          <a:ext cx="2839417" cy="1135766"/>
+          <a:off x="2597263" y="1599598"/>
+          <a:ext cx="2880350" cy="1152140"/>
         </a:xfrm>
         <a:prstGeom prst="chevron">
           <a:avLst/>
@@ -2684,12 +2708,12 @@
         </a:fontRef>
       </dsp:style>
       <dsp:txBody>
-        <a:bodyPr spcFirstLastPara="0" vert="horz" wrap="square" lIns="52007" tIns="17336" rIns="17336" bIns="17336" numCol="1" spcCol="1270" anchor="ctr" anchorCtr="0">
+        <a:bodyPr spcFirstLastPara="0" vert="horz" wrap="square" lIns="56007" tIns="18669" rIns="18669" bIns="18669" numCol="1" spcCol="1270" anchor="ctr" anchorCtr="0">
           <a:noAutofit/>
         </a:bodyPr>
         <a:lstStyle/>
         <a:p>
-          <a:pPr marL="0" lvl="0" indent="0" algn="ctr" defTabSz="577850">
+          <a:pPr marL="0" lvl="0" indent="0" algn="ctr" defTabSz="622300">
             <a:lnSpc>
               <a:spcPct val="90000"/>
             </a:lnSpc>
@@ -2702,7 +2726,7 @@
             <a:buNone/>
           </a:pPr>
           <a:r>
-            <a:rPr lang="en-US" sz="1300" b="0" kern="1200" dirty="0">
+            <a:rPr lang="en-US" sz="1400" b="0" kern="1200" dirty="0">
               <a:latin typeface="Avenir Next LT Pro" panose="020B0504020202020204" pitchFamily="34" charset="0"/>
               <a:cs typeface="Arial" panose="020B0604020202020204" pitchFamily="34" charset="0"/>
             </a:rPr>
@@ -2711,8 +2735,8 @@
         </a:p>
       </dsp:txBody>
       <dsp:txXfrm>
-        <a:off x="3128236" y="1607785"/>
-        <a:ext cx="1703651" cy="1135766"/>
+        <a:off x="3173333" y="1599598"/>
+        <a:ext cx="1728210" cy="1152140"/>
       </dsp:txXfrm>
     </dsp:sp>
     <dsp:sp modelId="{ADB09BD5-FDE5-4565-B805-F8514E9B41D8}">
@@ -2722,8 +2746,8 @@
       </dsp:nvSpPr>
       <dsp:spPr>
         <a:xfrm>
-          <a:off x="5115829" y="1607785"/>
-          <a:ext cx="2839417" cy="1135766"/>
+          <a:off x="5189578" y="1599598"/>
+          <a:ext cx="2880350" cy="1152140"/>
         </a:xfrm>
         <a:prstGeom prst="chevron">
           <a:avLst/>
@@ -2760,12 +2784,12 @@
         </a:fontRef>
       </dsp:style>
       <dsp:txBody>
-        <a:bodyPr spcFirstLastPara="0" vert="horz" wrap="square" lIns="52007" tIns="17336" rIns="17336" bIns="17336" numCol="1" spcCol="1270" anchor="ctr" anchorCtr="0">
+        <a:bodyPr spcFirstLastPara="0" vert="horz" wrap="square" lIns="56007" tIns="18669" rIns="18669" bIns="18669" numCol="1" spcCol="1270" anchor="ctr" anchorCtr="0">
           <a:noAutofit/>
         </a:bodyPr>
         <a:lstStyle/>
         <a:p>
-          <a:pPr marL="0" lvl="0" indent="0" algn="ctr" defTabSz="577850">
+          <a:pPr marL="0" lvl="0" indent="0" algn="ctr" defTabSz="622300">
             <a:lnSpc>
               <a:spcPct val="90000"/>
             </a:lnSpc>
@@ -2778,7 +2802,7 @@
             <a:buNone/>
           </a:pPr>
           <a:r>
-            <a:rPr lang="en-US" sz="1300" b="0" kern="1200" dirty="0">
+            <a:rPr lang="en-US" sz="1400" b="0" kern="1200" dirty="0">
               <a:latin typeface="Avenir Next LT Pro" panose="020B0504020202020204" pitchFamily="34" charset="0"/>
               <a:cs typeface="Arial" panose="020B0604020202020204" pitchFamily="34" charset="0"/>
             </a:rPr>
@@ -2787,8 +2811,8 @@
         </a:p>
       </dsp:txBody>
       <dsp:txXfrm>
-        <a:off x="5683712" y="1607785"/>
-        <a:ext cx="1703651" cy="1135766"/>
+        <a:off x="5765648" y="1599598"/>
+        <a:ext cx="1728210" cy="1152140"/>
       </dsp:txXfrm>
     </dsp:sp>
     <dsp:sp modelId="{AC03897F-CF99-4275-9B69-5CD300EEF10F}">
@@ -2798,8 +2822,8 @@
       </dsp:nvSpPr>
       <dsp:spPr>
         <a:xfrm>
-          <a:off x="7676182" y="1603378"/>
-          <a:ext cx="2839417" cy="1135766"/>
+          <a:off x="7786842" y="1595128"/>
+          <a:ext cx="2880350" cy="1152140"/>
         </a:xfrm>
         <a:prstGeom prst="chevron">
           <a:avLst/>
@@ -2836,12 +2860,12 @@
         </a:fontRef>
       </dsp:style>
       <dsp:txBody>
-        <a:bodyPr spcFirstLastPara="0" vert="horz" wrap="square" lIns="52007" tIns="17336" rIns="17336" bIns="17336" numCol="1" spcCol="1270" anchor="ctr" anchorCtr="0">
+        <a:bodyPr spcFirstLastPara="0" vert="horz" wrap="square" lIns="56007" tIns="18669" rIns="18669" bIns="18669" numCol="1" spcCol="1270" anchor="ctr" anchorCtr="0">
           <a:noAutofit/>
         </a:bodyPr>
         <a:lstStyle/>
         <a:p>
-          <a:pPr marL="0" lvl="0" indent="0" algn="ctr" defTabSz="577850">
+          <a:pPr marL="0" lvl="0" indent="0" algn="ctr" defTabSz="622300">
             <a:lnSpc>
               <a:spcPct val="90000"/>
             </a:lnSpc>
@@ -2854,21 +2878,21 @@
             <a:buNone/>
           </a:pPr>
           <a:r>
-            <a:rPr lang="en-US" sz="1300" b="0" kern="1200" dirty="0">
+            <a:rPr lang="en-US" sz="1400" b="0" kern="1200" dirty="0">
               <a:latin typeface="Avenir Next LT Pro" panose="020B0504020202020204" pitchFamily="34" charset="0"/>
               <a:cs typeface="Arial" panose="020B0604020202020204" pitchFamily="34" charset="0"/>
             </a:rPr>
             <a:t>Targeted </a:t>
           </a:r>
           <a:r>
-            <a:rPr lang="en-US" sz="1300" b="0" kern="1200" dirty="0" err="1">
+            <a:rPr lang="en-US" sz="1400" b="0" kern="1200" dirty="0" err="1">
               <a:latin typeface="Avenir Next LT Pro" panose="020B0504020202020204" pitchFamily="34" charset="0"/>
               <a:cs typeface="Arial" panose="020B0604020202020204" pitchFamily="34" charset="0"/>
             </a:rPr>
             <a:t>bioactivity:exposure</a:t>
           </a:r>
           <a:r>
-            <a:rPr lang="en-US" sz="1300" b="0" kern="1200" dirty="0">
+            <a:rPr lang="en-US" sz="1400" b="0" kern="1200" dirty="0">
               <a:latin typeface="Avenir Next LT Pro" panose="020B0504020202020204" pitchFamily="34" charset="0"/>
               <a:cs typeface="Arial" panose="020B0604020202020204" pitchFamily="34" charset="0"/>
             </a:rPr>
@@ -2877,8 +2901,8 @@
         </a:p>
       </dsp:txBody>
       <dsp:txXfrm>
-        <a:off x="8244065" y="1603378"/>
-        <a:ext cx="1703651" cy="1135766"/>
+        <a:off x="8362912" y="1595128"/>
+        <a:ext cx="1728210" cy="1152140"/>
       </dsp:txXfrm>
     </dsp:sp>
   </dsp:spTree>
@@ -7870,7 +7894,7 @@
         </p:nvCxnSpPr>
         <p:spPr>
           <a:xfrm>
-            <a:off x="3312234" y="1605516"/>
+            <a:off x="3304283" y="1605516"/>
             <a:ext cx="0" cy="5205484"/>
           </a:xfrm>
           <a:prstGeom prst="line">
@@ -7914,14 +7938,14 @@
             <p:ph idx="1"/>
             <p:extLst>
               <p:ext uri="{D42A27DB-BD31-4B8C-83A1-F6EECF244321}">
-                <p14:modId xmlns:p14="http://schemas.microsoft.com/office/powerpoint/2010/main" val="534792687"/>
+                <p14:modId xmlns:p14="http://schemas.microsoft.com/office/powerpoint/2010/main" val="2061981393"/>
               </p:ext>
             </p:extLst>
           </p:nvPr>
         </p:nvGraphicFramePr>
         <p:xfrm>
-          <a:off x="890798" y="-1149494"/>
-          <a:ext cx="10515600" cy="4351338"/>
+          <a:off x="811282" y="-1149494"/>
+          <a:ext cx="10667193" cy="4351338"/>
         </p:xfrm>
         <a:graphic>
           <a:graphicData uri="http://schemas.openxmlformats.org/drawingml/2006/diagram">
@@ -8880,7 +8904,7 @@
         </p:nvCxnSpPr>
         <p:spPr>
           <a:xfrm>
-            <a:off x="8455896" y="1605516"/>
+            <a:off x="8463847" y="1605516"/>
             <a:ext cx="0" cy="5205484"/>
           </a:xfrm>
           <a:prstGeom prst="line">

</xml_diff>

<commit_message>
update prioritization numbers after updating to dev
</commit_message>
<xml_diff>
--- a/figures/fig1-workflow.pptx
+++ b/figures/fig1-workflow.pptx
@@ -113,1340 +113,6 @@
     </p:ext>
   </p:extLst>
 </p:presentation>
-</file>
-
-<file path=ppt/changesInfos/changesInfo1.xml><?xml version="1.0" encoding="utf-8"?>
-<pc:chgInfo xmlns:a="http://schemas.openxmlformats.org/drawingml/2006/main" xmlns:r="http://schemas.openxmlformats.org/officeDocument/2006/relationships" xmlns:ac="http://schemas.microsoft.com/office/drawing/2013/main/command" xmlns:pc="http://schemas.microsoft.com/office/powerpoint/2013/main/command">
-  <pc:docChgLst>
-    <pc:chgData name="Truong, Kimberly (she/her/hers)" userId="925efed1-480b-4601-a542-5efebb98d46d" providerId="ADAL" clId="{914C54CF-8645-4FB1-ACA4-FF32DA9EBB75}"/>
-    <pc:docChg chg="undo redo custSel delSld modSld modMainMaster modNotesMaster">
-      <pc:chgData name="Truong, Kimberly (she/her/hers)" userId="925efed1-480b-4601-a542-5efebb98d46d" providerId="ADAL" clId="{914C54CF-8645-4FB1-ACA4-FF32DA9EBB75}" dt="2024-04-16T20:36:28.945" v="265" actId="2696"/>
-      <pc:docMkLst>
-        <pc:docMk/>
-      </pc:docMkLst>
-      <pc:sldChg chg="modSp mod modNotes">
-        <pc:chgData name="Truong, Kimberly (she/her/hers)" userId="925efed1-480b-4601-a542-5efebb98d46d" providerId="ADAL" clId="{914C54CF-8645-4FB1-ACA4-FF32DA9EBB75}" dt="2024-04-16T20:34:21.537" v="263"/>
-        <pc:sldMkLst>
-          <pc:docMk/>
-          <pc:sldMk cId="312177612" sldId="2969"/>
-        </pc:sldMkLst>
-        <pc:spChg chg="mod">
-          <ac:chgData name="Truong, Kimberly (she/her/hers)" userId="925efed1-480b-4601-a542-5efebb98d46d" providerId="ADAL" clId="{914C54CF-8645-4FB1-ACA4-FF32DA9EBB75}" dt="2024-04-16T20:34:21.537" v="263"/>
-          <ac:spMkLst>
-            <pc:docMk/>
-            <pc:sldMk cId="312177612" sldId="2969"/>
-            <ac:spMk id="15" creationId="{FAB754F1-85E0-422D-8F7A-B819C89A0AA5}"/>
-          </ac:spMkLst>
-        </pc:spChg>
-        <pc:spChg chg="mod">
-          <ac:chgData name="Truong, Kimberly (she/her/hers)" userId="925efed1-480b-4601-a542-5efebb98d46d" providerId="ADAL" clId="{914C54CF-8645-4FB1-ACA4-FF32DA9EBB75}" dt="2024-04-16T20:34:21.537" v="263"/>
-          <ac:spMkLst>
-            <pc:docMk/>
-            <pc:sldMk cId="312177612" sldId="2969"/>
-            <ac:spMk id="16" creationId="{BDA81BDF-EE59-006A-8397-64567E2F85D6}"/>
-          </ac:spMkLst>
-        </pc:spChg>
-        <pc:spChg chg="mod">
-          <ac:chgData name="Truong, Kimberly (she/her/hers)" userId="925efed1-480b-4601-a542-5efebb98d46d" providerId="ADAL" clId="{914C54CF-8645-4FB1-ACA4-FF32DA9EBB75}" dt="2024-04-16T20:34:21.537" v="263"/>
-          <ac:spMkLst>
-            <pc:docMk/>
-            <pc:sldMk cId="312177612" sldId="2969"/>
-            <ac:spMk id="17" creationId="{CBE42328-7860-4F4C-85FA-58954216A450}"/>
-          </ac:spMkLst>
-        </pc:spChg>
-        <pc:spChg chg="mod">
-          <ac:chgData name="Truong, Kimberly (she/her/hers)" userId="925efed1-480b-4601-a542-5efebb98d46d" providerId="ADAL" clId="{914C54CF-8645-4FB1-ACA4-FF32DA9EBB75}" dt="2024-04-16T20:34:21.537" v="263"/>
-          <ac:spMkLst>
-            <pc:docMk/>
-            <pc:sldMk cId="312177612" sldId="2969"/>
-            <ac:spMk id="18" creationId="{BF75DEBA-C8B6-085A-65E7-BBBA27E3E5D7}"/>
-          </ac:spMkLst>
-        </pc:spChg>
-        <pc:spChg chg="mod">
-          <ac:chgData name="Truong, Kimberly (she/her/hers)" userId="925efed1-480b-4601-a542-5efebb98d46d" providerId="ADAL" clId="{914C54CF-8645-4FB1-ACA4-FF32DA9EBB75}" dt="2024-04-16T20:34:21.537" v="263"/>
-          <ac:spMkLst>
-            <pc:docMk/>
-            <pc:sldMk cId="312177612" sldId="2969"/>
-            <ac:spMk id="19" creationId="{ECF95AB4-396B-1A30-C8A0-A2E3F380559B}"/>
-          </ac:spMkLst>
-        </pc:spChg>
-        <pc:spChg chg="mod">
-          <ac:chgData name="Truong, Kimberly (she/her/hers)" userId="925efed1-480b-4601-a542-5efebb98d46d" providerId="ADAL" clId="{914C54CF-8645-4FB1-ACA4-FF32DA9EBB75}" dt="2024-04-16T20:34:21.537" v="263"/>
-          <ac:spMkLst>
-            <pc:docMk/>
-            <pc:sldMk cId="312177612" sldId="2969"/>
-            <ac:spMk id="21" creationId="{91236F16-7D03-A616-78BE-020B10C1213B}"/>
-          </ac:spMkLst>
-        </pc:spChg>
-        <pc:spChg chg="mod">
-          <ac:chgData name="Truong, Kimberly (she/her/hers)" userId="925efed1-480b-4601-a542-5efebb98d46d" providerId="ADAL" clId="{914C54CF-8645-4FB1-ACA4-FF32DA9EBB75}" dt="2024-04-16T20:34:21.537" v="263"/>
-          <ac:spMkLst>
-            <pc:docMk/>
-            <pc:sldMk cId="312177612" sldId="2969"/>
-            <ac:spMk id="22" creationId="{1CF16134-8035-21CE-3EE6-ACE8B274FA65}"/>
-          </ac:spMkLst>
-        </pc:spChg>
-        <pc:spChg chg="mod">
-          <ac:chgData name="Truong, Kimberly (she/her/hers)" userId="925efed1-480b-4601-a542-5efebb98d46d" providerId="ADAL" clId="{914C54CF-8645-4FB1-ACA4-FF32DA9EBB75}" dt="2024-04-16T20:34:21.537" v="263"/>
-          <ac:spMkLst>
-            <pc:docMk/>
-            <pc:sldMk cId="312177612" sldId="2969"/>
-            <ac:spMk id="23" creationId="{526748DC-44E9-4212-50E3-026AD11D55E9}"/>
-          </ac:spMkLst>
-        </pc:spChg>
-        <pc:spChg chg="mod">
-          <ac:chgData name="Truong, Kimberly (she/her/hers)" userId="925efed1-480b-4601-a542-5efebb98d46d" providerId="ADAL" clId="{914C54CF-8645-4FB1-ACA4-FF32DA9EBB75}" dt="2024-04-16T20:34:21.537" v="263"/>
-          <ac:spMkLst>
-            <pc:docMk/>
-            <pc:sldMk cId="312177612" sldId="2969"/>
-            <ac:spMk id="29" creationId="{73DFA4F3-2CA7-9EEA-6D4E-9FC905F9B3C9}"/>
-          </ac:spMkLst>
-        </pc:spChg>
-        <pc:spChg chg="mod">
-          <ac:chgData name="Truong, Kimberly (she/her/hers)" userId="925efed1-480b-4601-a542-5efebb98d46d" providerId="ADAL" clId="{914C54CF-8645-4FB1-ACA4-FF32DA9EBB75}" dt="2024-04-16T20:34:21.537" v="263"/>
-          <ac:spMkLst>
-            <pc:docMk/>
-            <pc:sldMk cId="312177612" sldId="2969"/>
-            <ac:spMk id="30" creationId="{FD89976F-3EAE-7A09-F64A-F156F72DA967}"/>
-          </ac:spMkLst>
-        </pc:spChg>
-        <pc:spChg chg="mod">
-          <ac:chgData name="Truong, Kimberly (she/her/hers)" userId="925efed1-480b-4601-a542-5efebb98d46d" providerId="ADAL" clId="{914C54CF-8645-4FB1-ACA4-FF32DA9EBB75}" dt="2024-04-16T20:34:21.537" v="263"/>
-          <ac:spMkLst>
-            <pc:docMk/>
-            <pc:sldMk cId="312177612" sldId="2969"/>
-            <ac:spMk id="31" creationId="{C3D87C59-F48A-EC45-DF9C-F824CAC6FF58}"/>
-          </ac:spMkLst>
-        </pc:spChg>
-        <pc:spChg chg="mod">
-          <ac:chgData name="Truong, Kimberly (she/her/hers)" userId="925efed1-480b-4601-a542-5efebb98d46d" providerId="ADAL" clId="{914C54CF-8645-4FB1-ACA4-FF32DA9EBB75}" dt="2024-04-16T20:34:21.537" v="263"/>
-          <ac:spMkLst>
-            <pc:docMk/>
-            <pc:sldMk cId="312177612" sldId="2969"/>
-            <ac:spMk id="33" creationId="{A0D4AF14-9207-5C3F-B95E-049705F81C39}"/>
-          </ac:spMkLst>
-        </pc:spChg>
-        <pc:spChg chg="mod">
-          <ac:chgData name="Truong, Kimberly (she/her/hers)" userId="925efed1-480b-4601-a542-5efebb98d46d" providerId="ADAL" clId="{914C54CF-8645-4FB1-ACA4-FF32DA9EBB75}" dt="2024-04-16T20:34:21.537" v="263"/>
-          <ac:spMkLst>
-            <pc:docMk/>
-            <pc:sldMk cId="312177612" sldId="2969"/>
-            <ac:spMk id="39" creationId="{E23DF677-8AE5-1978-C3F5-A1221B5A4E43}"/>
-          </ac:spMkLst>
-        </pc:spChg>
-        <pc:spChg chg="mod">
-          <ac:chgData name="Truong, Kimberly (she/her/hers)" userId="925efed1-480b-4601-a542-5efebb98d46d" providerId="ADAL" clId="{914C54CF-8645-4FB1-ACA4-FF32DA9EBB75}" dt="2024-04-16T20:34:21.537" v="263"/>
-          <ac:spMkLst>
-            <pc:docMk/>
-            <pc:sldMk cId="312177612" sldId="2969"/>
-            <ac:spMk id="40" creationId="{F14D9770-A517-F5A6-9A10-6319D6A5B643}"/>
-          </ac:spMkLst>
-        </pc:spChg>
-        <pc:spChg chg="mod">
-          <ac:chgData name="Truong, Kimberly (she/her/hers)" userId="925efed1-480b-4601-a542-5efebb98d46d" providerId="ADAL" clId="{914C54CF-8645-4FB1-ACA4-FF32DA9EBB75}" dt="2024-04-16T20:34:21.537" v="263"/>
-          <ac:spMkLst>
-            <pc:docMk/>
-            <pc:sldMk cId="312177612" sldId="2969"/>
-            <ac:spMk id="46" creationId="{87D014D5-3C9B-AA73-744A-0A1FF7E0B979}"/>
-          </ac:spMkLst>
-        </pc:spChg>
-        <pc:spChg chg="mod">
-          <ac:chgData name="Truong, Kimberly (she/her/hers)" userId="925efed1-480b-4601-a542-5efebb98d46d" providerId="ADAL" clId="{914C54CF-8645-4FB1-ACA4-FF32DA9EBB75}" dt="2024-04-16T20:34:21.537" v="263"/>
-          <ac:spMkLst>
-            <pc:docMk/>
-            <pc:sldMk cId="312177612" sldId="2969"/>
-            <ac:spMk id="49" creationId="{A0391B82-E113-6052-F878-87AC64265015}"/>
-          </ac:spMkLst>
-        </pc:spChg>
-        <pc:spChg chg="mod">
-          <ac:chgData name="Truong, Kimberly (she/her/hers)" userId="925efed1-480b-4601-a542-5efebb98d46d" providerId="ADAL" clId="{914C54CF-8645-4FB1-ACA4-FF32DA9EBB75}" dt="2024-04-16T20:34:21.537" v="263"/>
-          <ac:spMkLst>
-            <pc:docMk/>
-            <pc:sldMk cId="312177612" sldId="2969"/>
-            <ac:spMk id="56" creationId="{DE392B63-A87D-C137-5D27-F324F8012606}"/>
-          </ac:spMkLst>
-        </pc:spChg>
-        <pc:spChg chg="mod">
-          <ac:chgData name="Truong, Kimberly (she/her/hers)" userId="925efed1-480b-4601-a542-5efebb98d46d" providerId="ADAL" clId="{914C54CF-8645-4FB1-ACA4-FF32DA9EBB75}" dt="2024-04-16T20:34:21.537" v="263"/>
-          <ac:spMkLst>
-            <pc:docMk/>
-            <pc:sldMk cId="312177612" sldId="2969"/>
-            <ac:spMk id="57" creationId="{5C52125C-8ED8-7A5A-7DFD-C7FCDEED2B89}"/>
-          </ac:spMkLst>
-        </pc:spChg>
-        <pc:graphicFrameChg chg="mod">
-          <ac:chgData name="Truong, Kimberly (she/her/hers)" userId="925efed1-480b-4601-a542-5efebb98d46d" providerId="ADAL" clId="{914C54CF-8645-4FB1-ACA4-FF32DA9EBB75}" dt="2024-04-16T20:34:21.537" v="263"/>
-          <ac:graphicFrameMkLst>
-            <pc:docMk/>
-            <pc:sldMk cId="312177612" sldId="2969"/>
-            <ac:graphicFrameMk id="24" creationId="{EFF69940-0D6D-5518-442B-DBCC36EF3D3C}"/>
-          </ac:graphicFrameMkLst>
-        </pc:graphicFrameChg>
-        <pc:cxnChg chg="mod">
-          <ac:chgData name="Truong, Kimberly (she/her/hers)" userId="925efed1-480b-4601-a542-5efebb98d46d" providerId="ADAL" clId="{914C54CF-8645-4FB1-ACA4-FF32DA9EBB75}" dt="2024-04-16T20:34:21.537" v="263"/>
-          <ac:cxnSpMkLst>
-            <pc:docMk/>
-            <pc:sldMk cId="312177612" sldId="2969"/>
-            <ac:cxnSpMk id="27" creationId="{38C2D6F6-3A28-4662-00C5-DC1BAB7FDF85}"/>
-          </ac:cxnSpMkLst>
-        </pc:cxnChg>
-        <pc:cxnChg chg="mod">
-          <ac:chgData name="Truong, Kimberly (she/her/hers)" userId="925efed1-480b-4601-a542-5efebb98d46d" providerId="ADAL" clId="{914C54CF-8645-4FB1-ACA4-FF32DA9EBB75}" dt="2024-04-16T20:34:21.537" v="263"/>
-          <ac:cxnSpMkLst>
-            <pc:docMk/>
-            <pc:sldMk cId="312177612" sldId="2969"/>
-            <ac:cxnSpMk id="54" creationId="{3BBF8B0A-2E95-52A1-961C-83528AB8C482}"/>
-          </ac:cxnSpMkLst>
-        </pc:cxnChg>
-        <pc:cxnChg chg="mod">
-          <ac:chgData name="Truong, Kimberly (she/her/hers)" userId="925efed1-480b-4601-a542-5efebb98d46d" providerId="ADAL" clId="{914C54CF-8645-4FB1-ACA4-FF32DA9EBB75}" dt="2024-04-16T20:34:21.537" v="263"/>
-          <ac:cxnSpMkLst>
-            <pc:docMk/>
-            <pc:sldMk cId="312177612" sldId="2969"/>
-            <ac:cxnSpMk id="55" creationId="{3B418017-20B6-193A-A4DE-4BDCD4EBDC26}"/>
-          </ac:cxnSpMkLst>
-        </pc:cxnChg>
-        <pc:cxnChg chg="mod">
-          <ac:chgData name="Truong, Kimberly (she/her/hers)" userId="925efed1-480b-4601-a542-5efebb98d46d" providerId="ADAL" clId="{914C54CF-8645-4FB1-ACA4-FF32DA9EBB75}" dt="2024-04-16T20:34:21.537" v="263"/>
-          <ac:cxnSpMkLst>
-            <pc:docMk/>
-            <pc:sldMk cId="312177612" sldId="2969"/>
-            <ac:cxnSpMk id="89" creationId="{250BF3FB-AF8B-26FD-9AC5-2F679DA732BA}"/>
-          </ac:cxnSpMkLst>
-        </pc:cxnChg>
-        <pc:cxnChg chg="mod">
-          <ac:chgData name="Truong, Kimberly (she/her/hers)" userId="925efed1-480b-4601-a542-5efebb98d46d" providerId="ADAL" clId="{914C54CF-8645-4FB1-ACA4-FF32DA9EBB75}" dt="2024-04-16T20:34:21.537" v="263"/>
-          <ac:cxnSpMkLst>
-            <pc:docMk/>
-            <pc:sldMk cId="312177612" sldId="2969"/>
-            <ac:cxnSpMk id="93" creationId="{47336B65-2979-45AC-1A1E-60FABA0AE5BC}"/>
-          </ac:cxnSpMkLst>
-        </pc:cxnChg>
-      </pc:sldChg>
-      <pc:sldChg chg="addSp delSp modSp del mod">
-        <pc:chgData name="Truong, Kimberly (she/her/hers)" userId="925efed1-480b-4601-a542-5efebb98d46d" providerId="ADAL" clId="{914C54CF-8645-4FB1-ACA4-FF32DA9EBB75}" dt="2024-04-16T20:36:28.945" v="265" actId="2696"/>
-        <pc:sldMkLst>
-          <pc:docMk/>
-          <pc:sldMk cId="3571957079" sldId="2970"/>
-        </pc:sldMkLst>
-        <pc:spChg chg="del">
-          <ac:chgData name="Truong, Kimberly (she/her/hers)" userId="925efed1-480b-4601-a542-5efebb98d46d" providerId="ADAL" clId="{914C54CF-8645-4FB1-ACA4-FF32DA9EBB75}" dt="2024-04-16T19:48:27.182" v="2" actId="478"/>
-          <ac:spMkLst>
-            <pc:docMk/>
-            <pc:sldMk cId="3571957079" sldId="2970"/>
-            <ac:spMk id="2" creationId="{4E2B7A41-3EDA-AD77-5E01-81AF0C5E493A}"/>
-          </ac:spMkLst>
-        </pc:spChg>
-        <pc:spChg chg="del">
-          <ac:chgData name="Truong, Kimberly (she/her/hers)" userId="925efed1-480b-4601-a542-5efebb98d46d" providerId="ADAL" clId="{914C54CF-8645-4FB1-ACA4-FF32DA9EBB75}" dt="2024-04-16T19:48:28.235" v="3" actId="478"/>
-          <ac:spMkLst>
-            <pc:docMk/>
-            <pc:sldMk cId="3571957079" sldId="2970"/>
-            <ac:spMk id="3" creationId="{EBDE3A62-E87D-FD02-8A73-8BE11F160556}"/>
-          </ac:spMkLst>
-        </pc:spChg>
-        <pc:spChg chg="del mod topLvl">
-          <ac:chgData name="Truong, Kimberly (she/her/hers)" userId="925efed1-480b-4601-a542-5efebb98d46d" providerId="ADAL" clId="{914C54CF-8645-4FB1-ACA4-FF32DA9EBB75}" dt="2024-04-16T20:28:41.945" v="262" actId="478"/>
-          <ac:spMkLst>
-            <pc:docMk/>
-            <pc:sldMk cId="3571957079" sldId="2970"/>
-            <ac:spMk id="5" creationId="{D7654865-22D7-C7BE-0161-4D2AB83D197E}"/>
-          </ac:spMkLst>
-        </pc:spChg>
-        <pc:spChg chg="mod topLvl">
-          <ac:chgData name="Truong, Kimberly (she/her/hers)" userId="925efed1-480b-4601-a542-5efebb98d46d" providerId="ADAL" clId="{914C54CF-8645-4FB1-ACA4-FF32DA9EBB75}" dt="2024-04-16T20:36:09.981" v="264" actId="164"/>
-          <ac:spMkLst>
-            <pc:docMk/>
-            <pc:sldMk cId="3571957079" sldId="2970"/>
-            <ac:spMk id="14" creationId="{EE8020F7-FA48-A9F8-CDDF-2CE1C0997700}"/>
-          </ac:spMkLst>
-        </pc:spChg>
-        <pc:spChg chg="mod topLvl">
-          <ac:chgData name="Truong, Kimberly (she/her/hers)" userId="925efed1-480b-4601-a542-5efebb98d46d" providerId="ADAL" clId="{914C54CF-8645-4FB1-ACA4-FF32DA9EBB75}" dt="2024-04-16T20:36:09.981" v="264" actId="164"/>
-          <ac:spMkLst>
-            <pc:docMk/>
-            <pc:sldMk cId="3571957079" sldId="2970"/>
-            <ac:spMk id="15" creationId="{D1BCDA69-6257-79D6-2D36-14F7A9D0CF8B}"/>
-          </ac:spMkLst>
-        </pc:spChg>
-        <pc:spChg chg="mod topLvl">
-          <ac:chgData name="Truong, Kimberly (she/her/hers)" userId="925efed1-480b-4601-a542-5efebb98d46d" providerId="ADAL" clId="{914C54CF-8645-4FB1-ACA4-FF32DA9EBB75}" dt="2024-04-16T20:36:09.981" v="264" actId="164"/>
-          <ac:spMkLst>
-            <pc:docMk/>
-            <pc:sldMk cId="3571957079" sldId="2970"/>
-            <ac:spMk id="27" creationId="{664EDA9A-6C60-1DEE-E775-59D01EE6EB33}"/>
-          </ac:spMkLst>
-        </pc:spChg>
-        <pc:spChg chg="mod topLvl">
-          <ac:chgData name="Truong, Kimberly (she/her/hers)" userId="925efed1-480b-4601-a542-5efebb98d46d" providerId="ADAL" clId="{914C54CF-8645-4FB1-ACA4-FF32DA9EBB75}" dt="2024-04-16T20:36:09.981" v="264" actId="164"/>
-          <ac:spMkLst>
-            <pc:docMk/>
-            <pc:sldMk cId="3571957079" sldId="2970"/>
-            <ac:spMk id="28" creationId="{29A82265-FB06-C223-F3EC-BAC495B03817}"/>
-          </ac:spMkLst>
-        </pc:spChg>
-        <pc:spChg chg="mod topLvl">
-          <ac:chgData name="Truong, Kimberly (she/her/hers)" userId="925efed1-480b-4601-a542-5efebb98d46d" providerId="ADAL" clId="{914C54CF-8645-4FB1-ACA4-FF32DA9EBB75}" dt="2024-04-16T20:36:09.981" v="264" actId="164"/>
-          <ac:spMkLst>
-            <pc:docMk/>
-            <pc:sldMk cId="3571957079" sldId="2970"/>
-            <ac:spMk id="29" creationId="{0848D19F-D5C7-1BE1-A298-9D4BEDF0EB4E}"/>
-          </ac:spMkLst>
-        </pc:spChg>
-        <pc:spChg chg="mod topLvl">
-          <ac:chgData name="Truong, Kimberly (she/her/hers)" userId="925efed1-480b-4601-a542-5efebb98d46d" providerId="ADAL" clId="{914C54CF-8645-4FB1-ACA4-FF32DA9EBB75}" dt="2024-04-16T20:36:09.981" v="264" actId="164"/>
-          <ac:spMkLst>
-            <pc:docMk/>
-            <pc:sldMk cId="3571957079" sldId="2970"/>
-            <ac:spMk id="30" creationId="{2829E935-F33C-DA89-6208-0F80A8EEBBFF}"/>
-          </ac:spMkLst>
-        </pc:spChg>
-        <pc:spChg chg="mod topLvl">
-          <ac:chgData name="Truong, Kimberly (she/her/hers)" userId="925efed1-480b-4601-a542-5efebb98d46d" providerId="ADAL" clId="{914C54CF-8645-4FB1-ACA4-FF32DA9EBB75}" dt="2024-04-16T20:36:09.981" v="264" actId="164"/>
-          <ac:spMkLst>
-            <pc:docMk/>
-            <pc:sldMk cId="3571957079" sldId="2970"/>
-            <ac:spMk id="31" creationId="{7AC6372A-BAFA-5438-A372-8167018808A9}"/>
-          </ac:spMkLst>
-        </pc:spChg>
-        <pc:spChg chg="mod topLvl">
-          <ac:chgData name="Truong, Kimberly (she/her/hers)" userId="925efed1-480b-4601-a542-5efebb98d46d" providerId="ADAL" clId="{914C54CF-8645-4FB1-ACA4-FF32DA9EBB75}" dt="2024-04-16T20:36:09.981" v="264" actId="164"/>
-          <ac:spMkLst>
-            <pc:docMk/>
-            <pc:sldMk cId="3571957079" sldId="2970"/>
-            <ac:spMk id="32" creationId="{B9F52E9A-177F-9BF0-5EBA-746B5C8C9B53}"/>
-          </ac:spMkLst>
-        </pc:spChg>
-        <pc:spChg chg="mod topLvl">
-          <ac:chgData name="Truong, Kimberly (she/her/hers)" userId="925efed1-480b-4601-a542-5efebb98d46d" providerId="ADAL" clId="{914C54CF-8645-4FB1-ACA4-FF32DA9EBB75}" dt="2024-04-16T20:36:09.981" v="264" actId="164"/>
-          <ac:spMkLst>
-            <pc:docMk/>
-            <pc:sldMk cId="3571957079" sldId="2970"/>
-            <ac:spMk id="33" creationId="{39BB72A3-A61B-4E65-78A3-40DF71F41688}"/>
-          </ac:spMkLst>
-        </pc:spChg>
-        <pc:spChg chg="mod topLvl">
-          <ac:chgData name="Truong, Kimberly (she/her/hers)" userId="925efed1-480b-4601-a542-5efebb98d46d" providerId="ADAL" clId="{914C54CF-8645-4FB1-ACA4-FF32DA9EBB75}" dt="2024-04-16T20:36:09.981" v="264" actId="164"/>
-          <ac:spMkLst>
-            <pc:docMk/>
-            <pc:sldMk cId="3571957079" sldId="2970"/>
-            <ac:spMk id="34" creationId="{742F79D1-2A6D-A19D-055D-CE38BA404530}"/>
-          </ac:spMkLst>
-        </pc:spChg>
-        <pc:spChg chg="mod topLvl">
-          <ac:chgData name="Truong, Kimberly (she/her/hers)" userId="925efed1-480b-4601-a542-5efebb98d46d" providerId="ADAL" clId="{914C54CF-8645-4FB1-ACA4-FF32DA9EBB75}" dt="2024-04-16T20:36:09.981" v="264" actId="164"/>
-          <ac:spMkLst>
-            <pc:docMk/>
-            <pc:sldMk cId="3571957079" sldId="2970"/>
-            <ac:spMk id="35" creationId="{A7314DD1-4076-3BA3-70DD-08CDEA39C9C1}"/>
-          </ac:spMkLst>
-        </pc:spChg>
-        <pc:spChg chg="del mod topLvl">
-          <ac:chgData name="Truong, Kimberly (she/her/hers)" userId="925efed1-480b-4601-a542-5efebb98d46d" providerId="ADAL" clId="{914C54CF-8645-4FB1-ACA4-FF32DA9EBB75}" dt="2024-04-16T19:50:35.566" v="17" actId="478"/>
-          <ac:spMkLst>
-            <pc:docMk/>
-            <pc:sldMk cId="3571957079" sldId="2970"/>
-            <ac:spMk id="36" creationId="{C08A9127-60F3-9BC2-39CF-285FA18DEF4A}"/>
-          </ac:spMkLst>
-        </pc:spChg>
-        <pc:spChg chg="mod topLvl">
-          <ac:chgData name="Truong, Kimberly (she/her/hers)" userId="925efed1-480b-4601-a542-5efebb98d46d" providerId="ADAL" clId="{914C54CF-8645-4FB1-ACA4-FF32DA9EBB75}" dt="2024-04-16T20:36:09.981" v="264" actId="164"/>
-          <ac:spMkLst>
-            <pc:docMk/>
-            <pc:sldMk cId="3571957079" sldId="2970"/>
-            <ac:spMk id="42" creationId="{A22564C7-81A5-F8B5-912D-B47D31709812}"/>
-          </ac:spMkLst>
-        </pc:spChg>
-        <pc:spChg chg="mod topLvl">
-          <ac:chgData name="Truong, Kimberly (she/her/hers)" userId="925efed1-480b-4601-a542-5efebb98d46d" providerId="ADAL" clId="{914C54CF-8645-4FB1-ACA4-FF32DA9EBB75}" dt="2024-04-16T20:36:09.981" v="264" actId="164"/>
-          <ac:spMkLst>
-            <pc:docMk/>
-            <pc:sldMk cId="3571957079" sldId="2970"/>
-            <ac:spMk id="43" creationId="{AC5B1C34-EA57-ED4B-BFB6-3DA2A233F0F7}"/>
-          </ac:spMkLst>
-        </pc:spChg>
-        <pc:spChg chg="mod topLvl">
-          <ac:chgData name="Truong, Kimberly (she/her/hers)" userId="925efed1-480b-4601-a542-5efebb98d46d" providerId="ADAL" clId="{914C54CF-8645-4FB1-ACA4-FF32DA9EBB75}" dt="2024-04-16T20:36:09.981" v="264" actId="164"/>
-          <ac:spMkLst>
-            <pc:docMk/>
-            <pc:sldMk cId="3571957079" sldId="2970"/>
-            <ac:spMk id="44" creationId="{413D0F9D-FE18-C02E-1147-82D0DBBFDBBD}"/>
-          </ac:spMkLst>
-        </pc:spChg>
-        <pc:spChg chg="mod topLvl">
-          <ac:chgData name="Truong, Kimberly (she/her/hers)" userId="925efed1-480b-4601-a542-5efebb98d46d" providerId="ADAL" clId="{914C54CF-8645-4FB1-ACA4-FF32DA9EBB75}" dt="2024-04-16T20:36:09.981" v="264" actId="164"/>
-          <ac:spMkLst>
-            <pc:docMk/>
-            <pc:sldMk cId="3571957079" sldId="2970"/>
-            <ac:spMk id="46" creationId="{41EF9ED1-947E-E2E3-2800-38F4631CF5A5}"/>
-          </ac:spMkLst>
-        </pc:spChg>
-        <pc:spChg chg="mod topLvl">
-          <ac:chgData name="Truong, Kimberly (she/her/hers)" userId="925efed1-480b-4601-a542-5efebb98d46d" providerId="ADAL" clId="{914C54CF-8645-4FB1-ACA4-FF32DA9EBB75}" dt="2024-04-16T20:36:09.981" v="264" actId="164"/>
-          <ac:spMkLst>
-            <pc:docMk/>
-            <pc:sldMk cId="3571957079" sldId="2970"/>
-            <ac:spMk id="47" creationId="{34EF908E-3BC4-9E87-11D9-D6FD390FECCA}"/>
-          </ac:spMkLst>
-        </pc:spChg>
-        <pc:spChg chg="mod topLvl">
-          <ac:chgData name="Truong, Kimberly (she/her/hers)" userId="925efed1-480b-4601-a542-5efebb98d46d" providerId="ADAL" clId="{914C54CF-8645-4FB1-ACA4-FF32DA9EBB75}" dt="2024-04-16T20:36:09.981" v="264" actId="164"/>
-          <ac:spMkLst>
-            <pc:docMk/>
-            <pc:sldMk cId="3571957079" sldId="2970"/>
-            <ac:spMk id="48" creationId="{A425A070-ABCC-885A-5556-B5CEC4D90735}"/>
-          </ac:spMkLst>
-        </pc:spChg>
-        <pc:spChg chg="mod topLvl">
-          <ac:chgData name="Truong, Kimberly (she/her/hers)" userId="925efed1-480b-4601-a542-5efebb98d46d" providerId="ADAL" clId="{914C54CF-8645-4FB1-ACA4-FF32DA9EBB75}" dt="2024-04-16T20:34:21.537" v="263"/>
-          <ac:spMkLst>
-            <pc:docMk/>
-            <pc:sldMk cId="3571957079" sldId="2970"/>
-            <ac:spMk id="49" creationId="{5CE972E4-7B08-2EC8-0A9A-8AF3848534D1}"/>
-          </ac:spMkLst>
-        </pc:spChg>
-        <pc:spChg chg="mod topLvl">
-          <ac:chgData name="Truong, Kimberly (she/her/hers)" userId="925efed1-480b-4601-a542-5efebb98d46d" providerId="ADAL" clId="{914C54CF-8645-4FB1-ACA4-FF32DA9EBB75}" dt="2024-04-16T20:34:21.537" v="263"/>
-          <ac:spMkLst>
-            <pc:docMk/>
-            <pc:sldMk cId="3571957079" sldId="2970"/>
-            <ac:spMk id="50" creationId="{B7FB823A-825A-2666-EED4-F809976A44EA}"/>
-          </ac:spMkLst>
-        </pc:spChg>
-        <pc:spChg chg="mod topLvl">
-          <ac:chgData name="Truong, Kimberly (she/her/hers)" userId="925efed1-480b-4601-a542-5efebb98d46d" providerId="ADAL" clId="{914C54CF-8645-4FB1-ACA4-FF32DA9EBB75}" dt="2024-04-16T20:34:21.537" v="263"/>
-          <ac:spMkLst>
-            <pc:docMk/>
-            <pc:sldMk cId="3571957079" sldId="2970"/>
-            <ac:spMk id="51" creationId="{26D57CF1-733A-4D92-16D2-946D784750A2}"/>
-          </ac:spMkLst>
-        </pc:spChg>
-        <pc:spChg chg="mod topLvl">
-          <ac:chgData name="Truong, Kimberly (she/her/hers)" userId="925efed1-480b-4601-a542-5efebb98d46d" providerId="ADAL" clId="{914C54CF-8645-4FB1-ACA4-FF32DA9EBB75}" dt="2024-04-16T20:34:21.537" v="263"/>
-          <ac:spMkLst>
-            <pc:docMk/>
-            <pc:sldMk cId="3571957079" sldId="2970"/>
-            <ac:spMk id="52" creationId="{3865CD1E-91D4-188B-71C0-202316AD025D}"/>
-          </ac:spMkLst>
-        </pc:spChg>
-        <pc:spChg chg="mod topLvl">
-          <ac:chgData name="Truong, Kimberly (she/her/hers)" userId="925efed1-480b-4601-a542-5efebb98d46d" providerId="ADAL" clId="{914C54CF-8645-4FB1-ACA4-FF32DA9EBB75}" dt="2024-04-16T20:36:09.981" v="264" actId="164"/>
-          <ac:spMkLst>
-            <pc:docMk/>
-            <pc:sldMk cId="3571957079" sldId="2970"/>
-            <ac:spMk id="53" creationId="{A8598E13-AEEC-8233-4DDE-A87F047B3F3D}"/>
-          </ac:spMkLst>
-        </pc:spChg>
-        <pc:spChg chg="mod topLvl">
-          <ac:chgData name="Truong, Kimberly (she/her/hers)" userId="925efed1-480b-4601-a542-5efebb98d46d" providerId="ADAL" clId="{914C54CF-8645-4FB1-ACA4-FF32DA9EBB75}" dt="2024-04-16T20:36:09.981" v="264" actId="164"/>
-          <ac:spMkLst>
-            <pc:docMk/>
-            <pc:sldMk cId="3571957079" sldId="2970"/>
-            <ac:spMk id="54" creationId="{67872B0D-186D-A483-9214-CC115DAD8E64}"/>
-          </ac:spMkLst>
-        </pc:spChg>
-        <pc:spChg chg="mod topLvl">
-          <ac:chgData name="Truong, Kimberly (she/her/hers)" userId="925efed1-480b-4601-a542-5efebb98d46d" providerId="ADAL" clId="{914C54CF-8645-4FB1-ACA4-FF32DA9EBB75}" dt="2024-04-16T20:36:09.981" v="264" actId="164"/>
-          <ac:spMkLst>
-            <pc:docMk/>
-            <pc:sldMk cId="3571957079" sldId="2970"/>
-            <ac:spMk id="55" creationId="{5A399072-3579-9CCF-1C1F-9AC5958D3C13}"/>
-          </ac:spMkLst>
-        </pc:spChg>
-        <pc:spChg chg="mod topLvl">
-          <ac:chgData name="Truong, Kimberly (she/her/hers)" userId="925efed1-480b-4601-a542-5efebb98d46d" providerId="ADAL" clId="{914C54CF-8645-4FB1-ACA4-FF32DA9EBB75}" dt="2024-04-16T20:36:09.981" v="264" actId="164"/>
-          <ac:spMkLst>
-            <pc:docMk/>
-            <pc:sldMk cId="3571957079" sldId="2970"/>
-            <ac:spMk id="56" creationId="{2B0A7858-5D97-9AF3-BA6B-7B5CB0205043}"/>
-          </ac:spMkLst>
-        </pc:spChg>
-        <pc:spChg chg="mod topLvl">
-          <ac:chgData name="Truong, Kimberly (she/her/hers)" userId="925efed1-480b-4601-a542-5efebb98d46d" providerId="ADAL" clId="{914C54CF-8645-4FB1-ACA4-FF32DA9EBB75}" dt="2024-04-16T20:36:09.981" v="264" actId="164"/>
-          <ac:spMkLst>
-            <pc:docMk/>
-            <pc:sldMk cId="3571957079" sldId="2970"/>
-            <ac:spMk id="57" creationId="{D6631BD2-E7B5-35DA-E94B-3D24474F4B8A}"/>
-          </ac:spMkLst>
-        </pc:spChg>
-        <pc:spChg chg="mod topLvl">
-          <ac:chgData name="Truong, Kimberly (she/her/hers)" userId="925efed1-480b-4601-a542-5efebb98d46d" providerId="ADAL" clId="{914C54CF-8645-4FB1-ACA4-FF32DA9EBB75}" dt="2024-04-16T20:36:09.981" v="264" actId="164"/>
-          <ac:spMkLst>
-            <pc:docMk/>
-            <pc:sldMk cId="3571957079" sldId="2970"/>
-            <ac:spMk id="58" creationId="{1EBA666E-A063-42B2-3E5C-792E644DDA49}"/>
-          </ac:spMkLst>
-        </pc:spChg>
-        <pc:spChg chg="mod topLvl">
-          <ac:chgData name="Truong, Kimberly (she/her/hers)" userId="925efed1-480b-4601-a542-5efebb98d46d" providerId="ADAL" clId="{914C54CF-8645-4FB1-ACA4-FF32DA9EBB75}" dt="2024-04-16T20:36:09.981" v="264" actId="164"/>
-          <ac:spMkLst>
-            <pc:docMk/>
-            <pc:sldMk cId="3571957079" sldId="2970"/>
-            <ac:spMk id="59" creationId="{2F88DFC5-590F-D22C-B40F-DFF0757375B6}"/>
-          </ac:spMkLst>
-        </pc:spChg>
-        <pc:spChg chg="mod topLvl">
-          <ac:chgData name="Truong, Kimberly (she/her/hers)" userId="925efed1-480b-4601-a542-5efebb98d46d" providerId="ADAL" clId="{914C54CF-8645-4FB1-ACA4-FF32DA9EBB75}" dt="2024-04-16T20:36:09.981" v="264" actId="164"/>
-          <ac:spMkLst>
-            <pc:docMk/>
-            <pc:sldMk cId="3571957079" sldId="2970"/>
-            <ac:spMk id="60" creationId="{1BD0CCEF-B03F-ECDE-1659-EEEF4ED18648}"/>
-          </ac:spMkLst>
-        </pc:spChg>
-        <pc:spChg chg="mod topLvl">
-          <ac:chgData name="Truong, Kimberly (she/her/hers)" userId="925efed1-480b-4601-a542-5efebb98d46d" providerId="ADAL" clId="{914C54CF-8645-4FB1-ACA4-FF32DA9EBB75}" dt="2024-04-16T20:36:09.981" v="264" actId="164"/>
-          <ac:spMkLst>
-            <pc:docMk/>
-            <pc:sldMk cId="3571957079" sldId="2970"/>
-            <ac:spMk id="61" creationId="{5ABD6EDD-6640-490A-F4FC-3DC60DF2B763}"/>
-          </ac:spMkLst>
-        </pc:spChg>
-        <pc:spChg chg="mod topLvl">
-          <ac:chgData name="Truong, Kimberly (she/her/hers)" userId="925efed1-480b-4601-a542-5efebb98d46d" providerId="ADAL" clId="{914C54CF-8645-4FB1-ACA4-FF32DA9EBB75}" dt="2024-04-16T20:36:09.981" v="264" actId="164"/>
-          <ac:spMkLst>
-            <pc:docMk/>
-            <pc:sldMk cId="3571957079" sldId="2970"/>
-            <ac:spMk id="62" creationId="{B9C610BB-72BE-D039-A9A2-D3B4A3FA1052}"/>
-          </ac:spMkLst>
-        </pc:spChg>
-        <pc:spChg chg="mod topLvl">
-          <ac:chgData name="Truong, Kimberly (she/her/hers)" userId="925efed1-480b-4601-a542-5efebb98d46d" providerId="ADAL" clId="{914C54CF-8645-4FB1-ACA4-FF32DA9EBB75}" dt="2024-04-16T20:36:09.981" v="264" actId="164"/>
-          <ac:spMkLst>
-            <pc:docMk/>
-            <pc:sldMk cId="3571957079" sldId="2970"/>
-            <ac:spMk id="63" creationId="{AFE092CC-4970-6414-08C5-B86EF307C2DB}"/>
-          </ac:spMkLst>
-        </pc:spChg>
-        <pc:spChg chg="mod topLvl">
-          <ac:chgData name="Truong, Kimberly (she/her/hers)" userId="925efed1-480b-4601-a542-5efebb98d46d" providerId="ADAL" clId="{914C54CF-8645-4FB1-ACA4-FF32DA9EBB75}" dt="2024-04-16T20:36:09.981" v="264" actId="164"/>
-          <ac:spMkLst>
-            <pc:docMk/>
-            <pc:sldMk cId="3571957079" sldId="2970"/>
-            <ac:spMk id="64" creationId="{43556DFC-0E57-6A68-C436-CD4651C6FB3F}"/>
-          </ac:spMkLst>
-        </pc:spChg>
-        <pc:spChg chg="mod topLvl">
-          <ac:chgData name="Truong, Kimberly (she/her/hers)" userId="925efed1-480b-4601-a542-5efebb98d46d" providerId="ADAL" clId="{914C54CF-8645-4FB1-ACA4-FF32DA9EBB75}" dt="2024-04-16T20:36:09.981" v="264" actId="164"/>
-          <ac:spMkLst>
-            <pc:docMk/>
-            <pc:sldMk cId="3571957079" sldId="2970"/>
-            <ac:spMk id="65" creationId="{ACAF76CE-F0CC-B729-E938-FDCC5BCDE8E6}"/>
-          </ac:spMkLst>
-        </pc:spChg>
-        <pc:spChg chg="mod topLvl">
-          <ac:chgData name="Truong, Kimberly (she/her/hers)" userId="925efed1-480b-4601-a542-5efebb98d46d" providerId="ADAL" clId="{914C54CF-8645-4FB1-ACA4-FF32DA9EBB75}" dt="2024-04-16T20:36:09.981" v="264" actId="164"/>
-          <ac:spMkLst>
-            <pc:docMk/>
-            <pc:sldMk cId="3571957079" sldId="2970"/>
-            <ac:spMk id="66" creationId="{A69974F0-238E-F8C7-E90B-8958089ECCF6}"/>
-          </ac:spMkLst>
-        </pc:spChg>
-        <pc:spChg chg="mod topLvl">
-          <ac:chgData name="Truong, Kimberly (she/her/hers)" userId="925efed1-480b-4601-a542-5efebb98d46d" providerId="ADAL" clId="{914C54CF-8645-4FB1-ACA4-FF32DA9EBB75}" dt="2024-04-16T20:36:09.981" v="264" actId="164"/>
-          <ac:spMkLst>
-            <pc:docMk/>
-            <pc:sldMk cId="3571957079" sldId="2970"/>
-            <ac:spMk id="67" creationId="{B4D2375F-002F-A613-4063-59A1C93EBC1F}"/>
-          </ac:spMkLst>
-        </pc:spChg>
-        <pc:spChg chg="mod topLvl">
-          <ac:chgData name="Truong, Kimberly (she/her/hers)" userId="925efed1-480b-4601-a542-5efebb98d46d" providerId="ADAL" clId="{914C54CF-8645-4FB1-ACA4-FF32DA9EBB75}" dt="2024-04-16T20:36:09.981" v="264" actId="164"/>
-          <ac:spMkLst>
-            <pc:docMk/>
-            <pc:sldMk cId="3571957079" sldId="2970"/>
-            <ac:spMk id="68" creationId="{9091B464-43C8-5A47-0ECB-7E30B4208906}"/>
-          </ac:spMkLst>
-        </pc:spChg>
-        <pc:spChg chg="mod topLvl">
-          <ac:chgData name="Truong, Kimberly (she/her/hers)" userId="925efed1-480b-4601-a542-5efebb98d46d" providerId="ADAL" clId="{914C54CF-8645-4FB1-ACA4-FF32DA9EBB75}" dt="2024-04-16T20:36:09.981" v="264" actId="164"/>
-          <ac:spMkLst>
-            <pc:docMk/>
-            <pc:sldMk cId="3571957079" sldId="2970"/>
-            <ac:spMk id="69" creationId="{50EB521C-7934-4C25-D2FA-D6EDB73D90B4}"/>
-          </ac:spMkLst>
-        </pc:spChg>
-        <pc:spChg chg="mod topLvl">
-          <ac:chgData name="Truong, Kimberly (she/her/hers)" userId="925efed1-480b-4601-a542-5efebb98d46d" providerId="ADAL" clId="{914C54CF-8645-4FB1-ACA4-FF32DA9EBB75}" dt="2024-04-16T20:36:09.981" v="264" actId="164"/>
-          <ac:spMkLst>
-            <pc:docMk/>
-            <pc:sldMk cId="3571957079" sldId="2970"/>
-            <ac:spMk id="70" creationId="{4E9DCE11-E33D-4122-A3FC-4F92AAD0D86C}"/>
-          </ac:spMkLst>
-        </pc:spChg>
-        <pc:spChg chg="mod topLvl">
-          <ac:chgData name="Truong, Kimberly (she/her/hers)" userId="925efed1-480b-4601-a542-5efebb98d46d" providerId="ADAL" clId="{914C54CF-8645-4FB1-ACA4-FF32DA9EBB75}" dt="2024-04-16T20:36:09.981" v="264" actId="164"/>
-          <ac:spMkLst>
-            <pc:docMk/>
-            <pc:sldMk cId="3571957079" sldId="2970"/>
-            <ac:spMk id="71" creationId="{B9E678EC-D726-C85E-510F-E00B3CDC73D9}"/>
-          </ac:spMkLst>
-        </pc:spChg>
-        <pc:spChg chg="mod topLvl">
-          <ac:chgData name="Truong, Kimberly (she/her/hers)" userId="925efed1-480b-4601-a542-5efebb98d46d" providerId="ADAL" clId="{914C54CF-8645-4FB1-ACA4-FF32DA9EBB75}" dt="2024-04-16T20:36:09.981" v="264" actId="164"/>
-          <ac:spMkLst>
-            <pc:docMk/>
-            <pc:sldMk cId="3571957079" sldId="2970"/>
-            <ac:spMk id="72" creationId="{F88AB098-24B2-82C4-26B4-13AE8100CE93}"/>
-          </ac:spMkLst>
-        </pc:spChg>
-        <pc:spChg chg="mod topLvl">
-          <ac:chgData name="Truong, Kimberly (she/her/hers)" userId="925efed1-480b-4601-a542-5efebb98d46d" providerId="ADAL" clId="{914C54CF-8645-4FB1-ACA4-FF32DA9EBB75}" dt="2024-04-16T20:36:09.981" v="264" actId="164"/>
-          <ac:spMkLst>
-            <pc:docMk/>
-            <pc:sldMk cId="3571957079" sldId="2970"/>
-            <ac:spMk id="73" creationId="{1DDC345A-6963-5488-5836-00643EA0A6D8}"/>
-          </ac:spMkLst>
-        </pc:spChg>
-        <pc:spChg chg="mod topLvl">
-          <ac:chgData name="Truong, Kimberly (she/her/hers)" userId="925efed1-480b-4601-a542-5efebb98d46d" providerId="ADAL" clId="{914C54CF-8645-4FB1-ACA4-FF32DA9EBB75}" dt="2024-04-16T20:36:09.981" v="264" actId="164"/>
-          <ac:spMkLst>
-            <pc:docMk/>
-            <pc:sldMk cId="3571957079" sldId="2970"/>
-            <ac:spMk id="74" creationId="{30D3E9A9-9716-335B-70C8-DC83CE27BF7B}"/>
-          </ac:spMkLst>
-        </pc:spChg>
-        <pc:spChg chg="mod">
-          <ac:chgData name="Truong, Kimberly (she/her/hers)" userId="925efed1-480b-4601-a542-5efebb98d46d" providerId="ADAL" clId="{914C54CF-8645-4FB1-ACA4-FF32DA9EBB75}" dt="2024-04-16T20:34:21.537" v="263"/>
-          <ac:spMkLst>
-            <pc:docMk/>
-            <pc:sldMk cId="3571957079" sldId="2970"/>
-            <ac:spMk id="75" creationId="{9EC0A5A9-193E-30CD-340F-E3C33494D757}"/>
-          </ac:spMkLst>
-        </pc:spChg>
-        <pc:spChg chg="mod">
-          <ac:chgData name="Truong, Kimberly (she/her/hers)" userId="925efed1-480b-4601-a542-5efebb98d46d" providerId="ADAL" clId="{914C54CF-8645-4FB1-ACA4-FF32DA9EBB75}" dt="2024-04-16T20:34:21.537" v="263"/>
-          <ac:spMkLst>
-            <pc:docMk/>
-            <pc:sldMk cId="3571957079" sldId="2970"/>
-            <ac:spMk id="76" creationId="{9E019AD9-8C4D-1F7E-A80F-2DC82724BB6E}"/>
-          </ac:spMkLst>
-        </pc:spChg>
-        <pc:spChg chg="mod">
-          <ac:chgData name="Truong, Kimberly (she/her/hers)" userId="925efed1-480b-4601-a542-5efebb98d46d" providerId="ADAL" clId="{914C54CF-8645-4FB1-ACA4-FF32DA9EBB75}" dt="2024-04-16T20:34:21.537" v="263"/>
-          <ac:spMkLst>
-            <pc:docMk/>
-            <pc:sldMk cId="3571957079" sldId="2970"/>
-            <ac:spMk id="77" creationId="{3C0E65A1-8D1E-AAF4-6A9D-699C4FBEC336}"/>
-          </ac:spMkLst>
-        </pc:spChg>
-        <pc:spChg chg="mod">
-          <ac:chgData name="Truong, Kimberly (she/her/hers)" userId="925efed1-480b-4601-a542-5efebb98d46d" providerId="ADAL" clId="{914C54CF-8645-4FB1-ACA4-FF32DA9EBB75}" dt="2024-04-16T20:34:21.537" v="263"/>
-          <ac:spMkLst>
-            <pc:docMk/>
-            <pc:sldMk cId="3571957079" sldId="2970"/>
-            <ac:spMk id="78" creationId="{12489D9A-822B-0811-B8B1-BD1E5F7CCB31}"/>
-          </ac:spMkLst>
-        </pc:spChg>
-        <pc:spChg chg="mod topLvl">
-          <ac:chgData name="Truong, Kimberly (she/her/hers)" userId="925efed1-480b-4601-a542-5efebb98d46d" providerId="ADAL" clId="{914C54CF-8645-4FB1-ACA4-FF32DA9EBB75}" dt="2024-04-16T20:36:09.981" v="264" actId="164"/>
-          <ac:spMkLst>
-            <pc:docMk/>
-            <pc:sldMk cId="3571957079" sldId="2970"/>
-            <ac:spMk id="80" creationId="{CB09A36B-DC20-641F-2EDC-8A454D78E496}"/>
-          </ac:spMkLst>
-        </pc:spChg>
-        <pc:spChg chg="mod topLvl">
-          <ac:chgData name="Truong, Kimberly (she/her/hers)" userId="925efed1-480b-4601-a542-5efebb98d46d" providerId="ADAL" clId="{914C54CF-8645-4FB1-ACA4-FF32DA9EBB75}" dt="2024-04-16T20:36:09.981" v="264" actId="164"/>
-          <ac:spMkLst>
-            <pc:docMk/>
-            <pc:sldMk cId="3571957079" sldId="2970"/>
-            <ac:spMk id="81" creationId="{B4C8C228-AE70-D5FA-F2C1-73CCD5E7D3C5}"/>
-          </ac:spMkLst>
-        </pc:spChg>
-        <pc:spChg chg="mod topLvl">
-          <ac:chgData name="Truong, Kimberly (she/her/hers)" userId="925efed1-480b-4601-a542-5efebb98d46d" providerId="ADAL" clId="{914C54CF-8645-4FB1-ACA4-FF32DA9EBB75}" dt="2024-04-16T20:36:09.981" v="264" actId="164"/>
-          <ac:spMkLst>
-            <pc:docMk/>
-            <pc:sldMk cId="3571957079" sldId="2970"/>
-            <ac:spMk id="82" creationId="{0AFB7872-3A77-293C-7C71-18A14EBBDC4B}"/>
-          </ac:spMkLst>
-        </pc:spChg>
-        <pc:spChg chg="mod topLvl">
-          <ac:chgData name="Truong, Kimberly (she/her/hers)" userId="925efed1-480b-4601-a542-5efebb98d46d" providerId="ADAL" clId="{914C54CF-8645-4FB1-ACA4-FF32DA9EBB75}" dt="2024-04-16T20:36:09.981" v="264" actId="164"/>
-          <ac:spMkLst>
-            <pc:docMk/>
-            <pc:sldMk cId="3571957079" sldId="2970"/>
-            <ac:spMk id="83" creationId="{0624645D-0806-FB7C-1EDD-D7F02CA099FB}"/>
-          </ac:spMkLst>
-        </pc:spChg>
-        <pc:spChg chg="add mod">
-          <ac:chgData name="Truong, Kimberly (she/her/hers)" userId="925efed1-480b-4601-a542-5efebb98d46d" providerId="ADAL" clId="{914C54CF-8645-4FB1-ACA4-FF32DA9EBB75}" dt="2024-04-16T19:58:36.244" v="134" actId="571"/>
-          <ac:spMkLst>
-            <pc:docMk/>
-            <pc:sldMk cId="3571957079" sldId="2970"/>
-            <ac:spMk id="86" creationId="{32C44367-52C2-6752-22A8-B02F8FBC34ED}"/>
-          </ac:spMkLst>
-        </pc:spChg>
-        <pc:spChg chg="add mod">
-          <ac:chgData name="Truong, Kimberly (she/her/hers)" userId="925efed1-480b-4601-a542-5efebb98d46d" providerId="ADAL" clId="{914C54CF-8645-4FB1-ACA4-FF32DA9EBB75}" dt="2024-04-16T19:58:36.244" v="134" actId="571"/>
-          <ac:spMkLst>
-            <pc:docMk/>
-            <pc:sldMk cId="3571957079" sldId="2970"/>
-            <ac:spMk id="87" creationId="{E2F79705-D976-F5E4-4552-2BB0088362B2}"/>
-          </ac:spMkLst>
-        </pc:spChg>
-        <pc:spChg chg="add mod topLvl">
-          <ac:chgData name="Truong, Kimberly (she/her/hers)" userId="925efed1-480b-4601-a542-5efebb98d46d" providerId="ADAL" clId="{914C54CF-8645-4FB1-ACA4-FF32DA9EBB75}" dt="2024-04-16T20:36:09.981" v="264" actId="164"/>
-          <ac:spMkLst>
-            <pc:docMk/>
-            <pc:sldMk cId="3571957079" sldId="2970"/>
-            <ac:spMk id="89" creationId="{ACB83282-FE61-A991-9217-531714FBF64C}"/>
-          </ac:spMkLst>
-        </pc:spChg>
-        <pc:spChg chg="add mod topLvl">
-          <ac:chgData name="Truong, Kimberly (she/her/hers)" userId="925efed1-480b-4601-a542-5efebb98d46d" providerId="ADAL" clId="{914C54CF-8645-4FB1-ACA4-FF32DA9EBB75}" dt="2024-04-16T20:36:09.981" v="264" actId="164"/>
-          <ac:spMkLst>
-            <pc:docMk/>
-            <pc:sldMk cId="3571957079" sldId="2970"/>
-            <ac:spMk id="90" creationId="{9F43E67E-349E-160C-CA4A-63FA59A8B99A}"/>
-          </ac:spMkLst>
-        </pc:spChg>
-        <pc:spChg chg="add del mod">
-          <ac:chgData name="Truong, Kimberly (she/her/hers)" userId="925efed1-480b-4601-a542-5efebb98d46d" providerId="ADAL" clId="{914C54CF-8645-4FB1-ACA4-FF32DA9EBB75}" dt="2024-04-16T20:09:46.856" v="189" actId="478"/>
-          <ac:spMkLst>
-            <pc:docMk/>
-            <pc:sldMk cId="3571957079" sldId="2970"/>
-            <ac:spMk id="91" creationId="{2E02E791-D41F-4010-8B0C-4807DC79D3ED}"/>
-          </ac:spMkLst>
-        </pc:spChg>
-        <pc:spChg chg="add mod topLvl">
-          <ac:chgData name="Truong, Kimberly (she/her/hers)" userId="925efed1-480b-4601-a542-5efebb98d46d" providerId="ADAL" clId="{914C54CF-8645-4FB1-ACA4-FF32DA9EBB75}" dt="2024-04-16T20:36:09.981" v="264" actId="164"/>
-          <ac:spMkLst>
-            <pc:docMk/>
-            <pc:sldMk cId="3571957079" sldId="2970"/>
-            <ac:spMk id="92" creationId="{C213BC71-04C6-0B1A-6A73-553A99786314}"/>
-          </ac:spMkLst>
-        </pc:spChg>
-        <pc:grpChg chg="add del mod">
-          <ac:chgData name="Truong, Kimberly (she/her/hers)" userId="925efed1-480b-4601-a542-5efebb98d46d" providerId="ADAL" clId="{914C54CF-8645-4FB1-ACA4-FF32DA9EBB75}" dt="2024-04-16T19:49:49.606" v="12" actId="165"/>
-          <ac:grpSpMkLst>
-            <pc:docMk/>
-            <pc:sldMk cId="3571957079" sldId="2970"/>
-            <ac:grpSpMk id="4" creationId="{ACA6CF6E-83BF-F91A-E58A-679F480975A4}"/>
-          </ac:grpSpMkLst>
-        </pc:grpChg>
-        <pc:grpChg chg="mod topLvl">
-          <ac:chgData name="Truong, Kimberly (she/her/hers)" userId="925efed1-480b-4601-a542-5efebb98d46d" providerId="ADAL" clId="{914C54CF-8645-4FB1-ACA4-FF32DA9EBB75}" dt="2024-04-16T20:36:09.981" v="264" actId="164"/>
-          <ac:grpSpMkLst>
-            <pc:docMk/>
-            <pc:sldMk cId="3571957079" sldId="2970"/>
-            <ac:grpSpMk id="6" creationId="{0D86EC01-6234-A94E-C081-BD84275E2A39}"/>
-          </ac:grpSpMkLst>
-        </pc:grpChg>
-        <pc:grpChg chg="del mod topLvl">
-          <ac:chgData name="Truong, Kimberly (she/her/hers)" userId="925efed1-480b-4601-a542-5efebb98d46d" providerId="ADAL" clId="{914C54CF-8645-4FB1-ACA4-FF32DA9EBB75}" dt="2024-04-16T19:56:30.887" v="117" actId="165"/>
-          <ac:grpSpMkLst>
-            <pc:docMk/>
-            <pc:sldMk cId="3571957079" sldId="2970"/>
-            <ac:grpSpMk id="7" creationId="{E0893250-7DB3-FBCE-B513-4697FBAA812B}"/>
-          </ac:grpSpMkLst>
-        </pc:grpChg>
-        <pc:grpChg chg="del mod topLvl">
-          <ac:chgData name="Truong, Kimberly (she/her/hers)" userId="925efed1-480b-4601-a542-5efebb98d46d" providerId="ADAL" clId="{914C54CF-8645-4FB1-ACA4-FF32DA9EBB75}" dt="2024-04-16T20:00:09.403" v="146" actId="165"/>
-          <ac:grpSpMkLst>
-            <pc:docMk/>
-            <pc:sldMk cId="3571957079" sldId="2970"/>
-            <ac:grpSpMk id="10" creationId="{0036699C-3CBB-9336-0A89-A3487BAFD2E7}"/>
-          </ac:grpSpMkLst>
-        </pc:grpChg>
-        <pc:grpChg chg="del mod topLvl">
-          <ac:chgData name="Truong, Kimberly (she/her/hers)" userId="925efed1-480b-4601-a542-5efebb98d46d" providerId="ADAL" clId="{914C54CF-8645-4FB1-ACA4-FF32DA9EBB75}" dt="2024-04-16T20:01:14.767" v="156" actId="165"/>
-          <ac:grpSpMkLst>
-            <pc:docMk/>
-            <pc:sldMk cId="3571957079" sldId="2970"/>
-            <ac:grpSpMk id="11" creationId="{DDC36D8B-AC22-20D5-C718-7A84F4BC4F50}"/>
-          </ac:grpSpMkLst>
-        </pc:grpChg>
-        <pc:grpChg chg="del mod topLvl">
-          <ac:chgData name="Truong, Kimberly (she/her/hers)" userId="925efed1-480b-4601-a542-5efebb98d46d" providerId="ADAL" clId="{914C54CF-8645-4FB1-ACA4-FF32DA9EBB75}" dt="2024-04-16T20:01:23.173" v="158" actId="165"/>
-          <ac:grpSpMkLst>
-            <pc:docMk/>
-            <pc:sldMk cId="3571957079" sldId="2970"/>
-            <ac:grpSpMk id="12" creationId="{51EE2F81-C560-E363-3381-528102855F86}"/>
-          </ac:grpSpMkLst>
-        </pc:grpChg>
-        <pc:grpChg chg="del mod topLvl">
-          <ac:chgData name="Truong, Kimberly (she/her/hers)" userId="925efed1-480b-4601-a542-5efebb98d46d" providerId="ADAL" clId="{914C54CF-8645-4FB1-ACA4-FF32DA9EBB75}" dt="2024-04-16T20:01:58.972" v="165" actId="165"/>
-          <ac:grpSpMkLst>
-            <pc:docMk/>
-            <pc:sldMk cId="3571957079" sldId="2970"/>
-            <ac:grpSpMk id="13" creationId="{0785B3B4-C0BA-1F19-1173-4E4858653DB5}"/>
-          </ac:grpSpMkLst>
-        </pc:grpChg>
-        <pc:grpChg chg="del mod topLvl">
-          <ac:chgData name="Truong, Kimberly (she/her/hers)" userId="925efed1-480b-4601-a542-5efebb98d46d" providerId="ADAL" clId="{914C54CF-8645-4FB1-ACA4-FF32DA9EBB75}" dt="2024-04-16T19:54:56.482" v="106" actId="165"/>
-          <ac:grpSpMkLst>
-            <pc:docMk/>
-            <pc:sldMk cId="3571957079" sldId="2970"/>
-            <ac:grpSpMk id="39" creationId="{15A4BAE0-5D08-169A-06DB-E397D4542978}"/>
-          </ac:grpSpMkLst>
-        </pc:grpChg>
-        <pc:grpChg chg="add del mod">
-          <ac:chgData name="Truong, Kimberly (she/her/hers)" userId="925efed1-480b-4601-a542-5efebb98d46d" providerId="ADAL" clId="{914C54CF-8645-4FB1-ACA4-FF32DA9EBB75}" dt="2024-04-16T19:51:01.437" v="21" actId="165"/>
-          <ac:grpSpMkLst>
-            <pc:docMk/>
-            <pc:sldMk cId="3571957079" sldId="2970"/>
-            <ac:grpSpMk id="79" creationId="{AADEB790-977A-1E4B-8C9D-3BF6429E36F8}"/>
-          </ac:grpSpMkLst>
-        </pc:grpChg>
-        <pc:grpChg chg="add mod topLvl">
-          <ac:chgData name="Truong, Kimberly (she/her/hers)" userId="925efed1-480b-4601-a542-5efebb98d46d" providerId="ADAL" clId="{914C54CF-8645-4FB1-ACA4-FF32DA9EBB75}" dt="2024-04-16T20:36:09.981" v="264" actId="164"/>
-          <ac:grpSpMkLst>
-            <pc:docMk/>
-            <pc:sldMk cId="3571957079" sldId="2970"/>
-            <ac:grpSpMk id="85" creationId="{2647452B-5281-4FE7-43F6-7F8906902FDF}"/>
-          </ac:grpSpMkLst>
-        </pc:grpChg>
-        <pc:grpChg chg="add mod">
-          <ac:chgData name="Truong, Kimberly (she/her/hers)" userId="925efed1-480b-4601-a542-5efebb98d46d" providerId="ADAL" clId="{914C54CF-8645-4FB1-ACA4-FF32DA9EBB75}" dt="2024-04-16T19:59:23.125" v="138" actId="164"/>
-          <ac:grpSpMkLst>
-            <pc:docMk/>
-            <pc:sldMk cId="3571957079" sldId="2970"/>
-            <ac:grpSpMk id="88" creationId="{4255D28F-C02B-F924-43E6-7D74A18EE58D}"/>
-          </ac:grpSpMkLst>
-        </pc:grpChg>
-        <pc:grpChg chg="add del mod">
-          <ac:chgData name="Truong, Kimberly (she/her/hers)" userId="925efed1-480b-4601-a542-5efebb98d46d" providerId="ADAL" clId="{914C54CF-8645-4FB1-ACA4-FF32DA9EBB75}" dt="2024-04-16T20:25:43.701" v="238" actId="165"/>
-          <ac:grpSpMkLst>
-            <pc:docMk/>
-            <pc:sldMk cId="3571957079" sldId="2970"/>
-            <ac:grpSpMk id="99" creationId="{A52F7F0D-6790-9B97-25CE-E32C23C2F016}"/>
-          </ac:grpSpMkLst>
-        </pc:grpChg>
-        <pc:grpChg chg="add mod">
-          <ac:chgData name="Truong, Kimberly (she/her/hers)" userId="925efed1-480b-4601-a542-5efebb98d46d" providerId="ADAL" clId="{914C54CF-8645-4FB1-ACA4-FF32DA9EBB75}" dt="2024-04-16T20:36:09.981" v="264" actId="164"/>
-          <ac:grpSpMkLst>
-            <pc:docMk/>
-            <pc:sldMk cId="3571957079" sldId="2970"/>
-            <ac:grpSpMk id="103" creationId="{163B218F-6608-0F76-D0BE-F9B8F7271B7B}"/>
-          </ac:grpSpMkLst>
-        </pc:grpChg>
-        <pc:cxnChg chg="mod topLvl">
-          <ac:chgData name="Truong, Kimberly (she/her/hers)" userId="925efed1-480b-4601-a542-5efebb98d46d" providerId="ADAL" clId="{914C54CF-8645-4FB1-ACA4-FF32DA9EBB75}" dt="2024-04-16T20:34:21.537" v="263"/>
-          <ac:cxnSpMkLst>
-            <pc:docMk/>
-            <pc:sldMk cId="3571957079" sldId="2970"/>
-            <ac:cxnSpMk id="8" creationId="{BF9A9A77-C58D-4397-2FCD-45AEC90BA1C2}"/>
-          </ac:cxnSpMkLst>
-        </pc:cxnChg>
-        <pc:cxnChg chg="mod topLvl">
-          <ac:chgData name="Truong, Kimberly (she/her/hers)" userId="925efed1-480b-4601-a542-5efebb98d46d" providerId="ADAL" clId="{914C54CF-8645-4FB1-ACA4-FF32DA9EBB75}" dt="2024-04-16T20:34:21.537" v="263"/>
-          <ac:cxnSpMkLst>
-            <pc:docMk/>
-            <pc:sldMk cId="3571957079" sldId="2970"/>
-            <ac:cxnSpMk id="9" creationId="{B625BDF1-8BF7-CB7F-2020-C68A6C2EEF69}"/>
-          </ac:cxnSpMkLst>
-        </pc:cxnChg>
-        <pc:cxnChg chg="mod topLvl">
-          <ac:chgData name="Truong, Kimberly (she/her/hers)" userId="925efed1-480b-4601-a542-5efebb98d46d" providerId="ADAL" clId="{914C54CF-8645-4FB1-ACA4-FF32DA9EBB75}" dt="2024-04-16T20:36:09.981" v="264" actId="164"/>
-          <ac:cxnSpMkLst>
-            <pc:docMk/>
-            <pc:sldMk cId="3571957079" sldId="2970"/>
-            <ac:cxnSpMk id="16" creationId="{3353AB68-45AF-BA63-07D4-F6B421BDCFAF}"/>
-          </ac:cxnSpMkLst>
-        </pc:cxnChg>
-        <pc:cxnChg chg="mod topLvl">
-          <ac:chgData name="Truong, Kimberly (she/her/hers)" userId="925efed1-480b-4601-a542-5efebb98d46d" providerId="ADAL" clId="{914C54CF-8645-4FB1-ACA4-FF32DA9EBB75}" dt="2024-04-16T20:36:09.981" v="264" actId="164"/>
-          <ac:cxnSpMkLst>
-            <pc:docMk/>
-            <pc:sldMk cId="3571957079" sldId="2970"/>
-            <ac:cxnSpMk id="17" creationId="{F0C468EF-5121-A435-11F8-BF8C67A6C80E}"/>
-          </ac:cxnSpMkLst>
-        </pc:cxnChg>
-        <pc:cxnChg chg="mod topLvl">
-          <ac:chgData name="Truong, Kimberly (she/her/hers)" userId="925efed1-480b-4601-a542-5efebb98d46d" providerId="ADAL" clId="{914C54CF-8645-4FB1-ACA4-FF32DA9EBB75}" dt="2024-04-16T20:36:09.981" v="264" actId="164"/>
-          <ac:cxnSpMkLst>
-            <pc:docMk/>
-            <pc:sldMk cId="3571957079" sldId="2970"/>
-            <ac:cxnSpMk id="18" creationId="{BD6A3E3E-FD1D-BB3C-3733-84030B81CF3A}"/>
-          </ac:cxnSpMkLst>
-        </pc:cxnChg>
-        <pc:cxnChg chg="mod topLvl">
-          <ac:chgData name="Truong, Kimberly (she/her/hers)" userId="925efed1-480b-4601-a542-5efebb98d46d" providerId="ADAL" clId="{914C54CF-8645-4FB1-ACA4-FF32DA9EBB75}" dt="2024-04-16T20:36:09.981" v="264" actId="164"/>
-          <ac:cxnSpMkLst>
-            <pc:docMk/>
-            <pc:sldMk cId="3571957079" sldId="2970"/>
-            <ac:cxnSpMk id="19" creationId="{A8C8C01F-4D30-70C2-8057-932F10E19679}"/>
-          </ac:cxnSpMkLst>
-        </pc:cxnChg>
-        <pc:cxnChg chg="mod topLvl">
-          <ac:chgData name="Truong, Kimberly (she/her/hers)" userId="925efed1-480b-4601-a542-5efebb98d46d" providerId="ADAL" clId="{914C54CF-8645-4FB1-ACA4-FF32DA9EBB75}" dt="2024-04-16T20:36:09.981" v="264" actId="164"/>
-          <ac:cxnSpMkLst>
-            <pc:docMk/>
-            <pc:sldMk cId="3571957079" sldId="2970"/>
-            <ac:cxnSpMk id="20" creationId="{6C43B401-5CE5-9F9C-BFC0-1E98DE3DC3DF}"/>
-          </ac:cxnSpMkLst>
-        </pc:cxnChg>
-        <pc:cxnChg chg="mod topLvl">
-          <ac:chgData name="Truong, Kimberly (she/her/hers)" userId="925efed1-480b-4601-a542-5efebb98d46d" providerId="ADAL" clId="{914C54CF-8645-4FB1-ACA4-FF32DA9EBB75}" dt="2024-04-16T20:36:09.981" v="264" actId="164"/>
-          <ac:cxnSpMkLst>
-            <pc:docMk/>
-            <pc:sldMk cId="3571957079" sldId="2970"/>
-            <ac:cxnSpMk id="21" creationId="{EB6F60D9-AD7A-B5B5-353B-35905223BF9F}"/>
-          </ac:cxnSpMkLst>
-        </pc:cxnChg>
-        <pc:cxnChg chg="mod topLvl">
-          <ac:chgData name="Truong, Kimberly (she/her/hers)" userId="925efed1-480b-4601-a542-5efebb98d46d" providerId="ADAL" clId="{914C54CF-8645-4FB1-ACA4-FF32DA9EBB75}" dt="2024-04-16T20:36:09.981" v="264" actId="164"/>
-          <ac:cxnSpMkLst>
-            <pc:docMk/>
-            <pc:sldMk cId="3571957079" sldId="2970"/>
-            <ac:cxnSpMk id="22" creationId="{2145E68E-045B-EC32-FDC1-B7D73AAC21C3}"/>
-          </ac:cxnSpMkLst>
-        </pc:cxnChg>
-        <pc:cxnChg chg="mod topLvl">
-          <ac:chgData name="Truong, Kimberly (she/her/hers)" userId="925efed1-480b-4601-a542-5efebb98d46d" providerId="ADAL" clId="{914C54CF-8645-4FB1-ACA4-FF32DA9EBB75}" dt="2024-04-16T20:36:09.981" v="264" actId="164"/>
-          <ac:cxnSpMkLst>
-            <pc:docMk/>
-            <pc:sldMk cId="3571957079" sldId="2970"/>
-            <ac:cxnSpMk id="23" creationId="{EF776936-7A40-ACA9-18EF-7A222057E716}"/>
-          </ac:cxnSpMkLst>
-        </pc:cxnChg>
-        <pc:cxnChg chg="mod topLvl">
-          <ac:chgData name="Truong, Kimberly (she/her/hers)" userId="925efed1-480b-4601-a542-5efebb98d46d" providerId="ADAL" clId="{914C54CF-8645-4FB1-ACA4-FF32DA9EBB75}" dt="2024-04-16T20:36:09.981" v="264" actId="164"/>
-          <ac:cxnSpMkLst>
-            <pc:docMk/>
-            <pc:sldMk cId="3571957079" sldId="2970"/>
-            <ac:cxnSpMk id="24" creationId="{06A5764E-D15C-7D86-3EED-63DE96F1FEC7}"/>
-          </ac:cxnSpMkLst>
-        </pc:cxnChg>
-        <pc:cxnChg chg="mod topLvl">
-          <ac:chgData name="Truong, Kimberly (she/her/hers)" userId="925efed1-480b-4601-a542-5efebb98d46d" providerId="ADAL" clId="{914C54CF-8645-4FB1-ACA4-FF32DA9EBB75}" dt="2024-04-16T20:36:09.981" v="264" actId="164"/>
-          <ac:cxnSpMkLst>
-            <pc:docMk/>
-            <pc:sldMk cId="3571957079" sldId="2970"/>
-            <ac:cxnSpMk id="25" creationId="{15FA5AC2-0DD5-1FDA-E21D-538C4144C3EF}"/>
-          </ac:cxnSpMkLst>
-        </pc:cxnChg>
-        <pc:cxnChg chg="mod topLvl">
-          <ac:chgData name="Truong, Kimberly (she/her/hers)" userId="925efed1-480b-4601-a542-5efebb98d46d" providerId="ADAL" clId="{914C54CF-8645-4FB1-ACA4-FF32DA9EBB75}" dt="2024-04-16T20:36:09.981" v="264" actId="164"/>
-          <ac:cxnSpMkLst>
-            <pc:docMk/>
-            <pc:sldMk cId="3571957079" sldId="2970"/>
-            <ac:cxnSpMk id="26" creationId="{AE855474-86A4-3F54-829B-D0C1EB392759}"/>
-          </ac:cxnSpMkLst>
-        </pc:cxnChg>
-        <pc:cxnChg chg="mod topLvl">
-          <ac:chgData name="Truong, Kimberly (she/her/hers)" userId="925efed1-480b-4601-a542-5efebb98d46d" providerId="ADAL" clId="{914C54CF-8645-4FB1-ACA4-FF32DA9EBB75}" dt="2024-04-16T20:36:09.981" v="264" actId="164"/>
-          <ac:cxnSpMkLst>
-            <pc:docMk/>
-            <pc:sldMk cId="3571957079" sldId="2970"/>
-            <ac:cxnSpMk id="37" creationId="{07339045-98F4-15C8-B62F-FBCC70454993}"/>
-          </ac:cxnSpMkLst>
-        </pc:cxnChg>
-        <pc:cxnChg chg="mod topLvl">
-          <ac:chgData name="Truong, Kimberly (she/her/hers)" userId="925efed1-480b-4601-a542-5efebb98d46d" providerId="ADAL" clId="{914C54CF-8645-4FB1-ACA4-FF32DA9EBB75}" dt="2024-04-16T20:36:09.981" v="264" actId="164"/>
-          <ac:cxnSpMkLst>
-            <pc:docMk/>
-            <pc:sldMk cId="3571957079" sldId="2970"/>
-            <ac:cxnSpMk id="38" creationId="{27597C60-F248-ACBA-06BE-72CC161B2A90}"/>
-          </ac:cxnSpMkLst>
-        </pc:cxnChg>
-        <pc:cxnChg chg="mod topLvl">
-          <ac:chgData name="Truong, Kimberly (she/her/hers)" userId="925efed1-480b-4601-a542-5efebb98d46d" providerId="ADAL" clId="{914C54CF-8645-4FB1-ACA4-FF32DA9EBB75}" dt="2024-04-16T20:36:09.981" v="264" actId="164"/>
-          <ac:cxnSpMkLst>
-            <pc:docMk/>
-            <pc:sldMk cId="3571957079" sldId="2970"/>
-            <ac:cxnSpMk id="40" creationId="{2550FF2A-77BF-F14F-BB9D-D13EA209A857}"/>
-          </ac:cxnSpMkLst>
-        </pc:cxnChg>
-        <pc:cxnChg chg="mod topLvl">
-          <ac:chgData name="Truong, Kimberly (she/her/hers)" userId="925efed1-480b-4601-a542-5efebb98d46d" providerId="ADAL" clId="{914C54CF-8645-4FB1-ACA4-FF32DA9EBB75}" dt="2024-04-16T20:36:09.981" v="264" actId="164"/>
-          <ac:cxnSpMkLst>
-            <pc:docMk/>
-            <pc:sldMk cId="3571957079" sldId="2970"/>
-            <ac:cxnSpMk id="41" creationId="{0EB30ECF-E96D-0300-583D-A53178C436A0}"/>
-          </ac:cxnSpMkLst>
-        </pc:cxnChg>
-        <pc:cxnChg chg="mod topLvl">
-          <ac:chgData name="Truong, Kimberly (she/her/hers)" userId="925efed1-480b-4601-a542-5efebb98d46d" providerId="ADAL" clId="{914C54CF-8645-4FB1-ACA4-FF32DA9EBB75}" dt="2024-04-16T20:36:09.981" v="264" actId="164"/>
-          <ac:cxnSpMkLst>
-            <pc:docMk/>
-            <pc:sldMk cId="3571957079" sldId="2970"/>
-            <ac:cxnSpMk id="45" creationId="{CED35D67-B9F0-0E31-12A6-83080A7C20F6}"/>
-          </ac:cxnSpMkLst>
-        </pc:cxnChg>
-      </pc:sldChg>
-      <pc:sldMasterChg chg="modSp modSldLayout">
-        <pc:chgData name="Truong, Kimberly (she/her/hers)" userId="925efed1-480b-4601-a542-5efebb98d46d" providerId="ADAL" clId="{914C54CF-8645-4FB1-ACA4-FF32DA9EBB75}" dt="2024-04-16T20:34:21.537" v="263"/>
-        <pc:sldMasterMkLst>
-          <pc:docMk/>
-          <pc:sldMasterMk cId="3935980576" sldId="2147483648"/>
-        </pc:sldMasterMkLst>
-        <pc:spChg chg="mod">
-          <ac:chgData name="Truong, Kimberly (she/her/hers)" userId="925efed1-480b-4601-a542-5efebb98d46d" providerId="ADAL" clId="{914C54CF-8645-4FB1-ACA4-FF32DA9EBB75}" dt="2024-04-16T20:34:21.537" v="263"/>
-          <ac:spMkLst>
-            <pc:docMk/>
-            <pc:sldMasterMk cId="3935980576" sldId="2147483648"/>
-            <ac:spMk id="2" creationId="{7FEC08B3-E356-D353-92E4-4401330CE36A}"/>
-          </ac:spMkLst>
-        </pc:spChg>
-        <pc:spChg chg="mod">
-          <ac:chgData name="Truong, Kimberly (she/her/hers)" userId="925efed1-480b-4601-a542-5efebb98d46d" providerId="ADAL" clId="{914C54CF-8645-4FB1-ACA4-FF32DA9EBB75}" dt="2024-04-16T20:34:21.537" v="263"/>
-          <ac:spMkLst>
-            <pc:docMk/>
-            <pc:sldMasterMk cId="3935980576" sldId="2147483648"/>
-            <ac:spMk id="3" creationId="{9C192C65-9DA0-8970-3952-B6DF1B72AA1F}"/>
-          </ac:spMkLst>
-        </pc:spChg>
-        <pc:spChg chg="mod">
-          <ac:chgData name="Truong, Kimberly (she/her/hers)" userId="925efed1-480b-4601-a542-5efebb98d46d" providerId="ADAL" clId="{914C54CF-8645-4FB1-ACA4-FF32DA9EBB75}" dt="2024-04-16T20:34:21.537" v="263"/>
-          <ac:spMkLst>
-            <pc:docMk/>
-            <pc:sldMasterMk cId="3935980576" sldId="2147483648"/>
-            <ac:spMk id="4" creationId="{C7BF0C25-307F-BEDB-E976-9A56AFEA5E10}"/>
-          </ac:spMkLst>
-        </pc:spChg>
-        <pc:spChg chg="mod">
-          <ac:chgData name="Truong, Kimberly (she/her/hers)" userId="925efed1-480b-4601-a542-5efebb98d46d" providerId="ADAL" clId="{914C54CF-8645-4FB1-ACA4-FF32DA9EBB75}" dt="2024-04-16T20:34:21.537" v="263"/>
-          <ac:spMkLst>
-            <pc:docMk/>
-            <pc:sldMasterMk cId="3935980576" sldId="2147483648"/>
-            <ac:spMk id="5" creationId="{6F2C61FB-E363-B4B8-03B6-8EB12DE6812E}"/>
-          </ac:spMkLst>
-        </pc:spChg>
-        <pc:spChg chg="mod">
-          <ac:chgData name="Truong, Kimberly (she/her/hers)" userId="925efed1-480b-4601-a542-5efebb98d46d" providerId="ADAL" clId="{914C54CF-8645-4FB1-ACA4-FF32DA9EBB75}" dt="2024-04-16T20:34:21.537" v="263"/>
-          <ac:spMkLst>
-            <pc:docMk/>
-            <pc:sldMasterMk cId="3935980576" sldId="2147483648"/>
-            <ac:spMk id="6" creationId="{1E52E0A1-795C-68D4-4C87-50C3A4BFF4E4}"/>
-          </ac:spMkLst>
-        </pc:spChg>
-        <pc:sldLayoutChg chg="modSp">
-          <pc:chgData name="Truong, Kimberly (she/her/hers)" userId="925efed1-480b-4601-a542-5efebb98d46d" providerId="ADAL" clId="{914C54CF-8645-4FB1-ACA4-FF32DA9EBB75}" dt="2024-04-16T20:34:21.537" v="263"/>
-          <pc:sldLayoutMkLst>
-            <pc:docMk/>
-            <pc:sldMasterMk cId="3935980576" sldId="2147483648"/>
-            <pc:sldLayoutMk cId="374687263" sldId="2147483649"/>
-          </pc:sldLayoutMkLst>
-          <pc:spChg chg="mod">
-            <ac:chgData name="Truong, Kimberly (she/her/hers)" userId="925efed1-480b-4601-a542-5efebb98d46d" providerId="ADAL" clId="{914C54CF-8645-4FB1-ACA4-FF32DA9EBB75}" dt="2024-04-16T20:34:21.537" v="263"/>
-            <ac:spMkLst>
-              <pc:docMk/>
-              <pc:sldMasterMk cId="3935980576" sldId="2147483648"/>
-              <pc:sldLayoutMk cId="374687263" sldId="2147483649"/>
-              <ac:spMk id="2" creationId="{004DA335-68E5-42B9-36A3-F7E56AE6C09E}"/>
-            </ac:spMkLst>
-          </pc:spChg>
-          <pc:spChg chg="mod">
-            <ac:chgData name="Truong, Kimberly (she/her/hers)" userId="925efed1-480b-4601-a542-5efebb98d46d" providerId="ADAL" clId="{914C54CF-8645-4FB1-ACA4-FF32DA9EBB75}" dt="2024-04-16T20:34:21.537" v="263"/>
-            <ac:spMkLst>
-              <pc:docMk/>
-              <pc:sldMasterMk cId="3935980576" sldId="2147483648"/>
-              <pc:sldLayoutMk cId="374687263" sldId="2147483649"/>
-              <ac:spMk id="3" creationId="{71357879-34C8-2ED1-617E-640B0870564E}"/>
-            </ac:spMkLst>
-          </pc:spChg>
-        </pc:sldLayoutChg>
-        <pc:sldLayoutChg chg="modSp">
-          <pc:chgData name="Truong, Kimberly (she/her/hers)" userId="925efed1-480b-4601-a542-5efebb98d46d" providerId="ADAL" clId="{914C54CF-8645-4FB1-ACA4-FF32DA9EBB75}" dt="2024-04-16T20:34:21.537" v="263"/>
-          <pc:sldLayoutMkLst>
-            <pc:docMk/>
-            <pc:sldMasterMk cId="3935980576" sldId="2147483648"/>
-            <pc:sldLayoutMk cId="3433536021" sldId="2147483651"/>
-          </pc:sldLayoutMkLst>
-          <pc:spChg chg="mod">
-            <ac:chgData name="Truong, Kimberly (she/her/hers)" userId="925efed1-480b-4601-a542-5efebb98d46d" providerId="ADAL" clId="{914C54CF-8645-4FB1-ACA4-FF32DA9EBB75}" dt="2024-04-16T20:34:21.537" v="263"/>
-            <ac:spMkLst>
-              <pc:docMk/>
-              <pc:sldMasterMk cId="3935980576" sldId="2147483648"/>
-              <pc:sldLayoutMk cId="3433536021" sldId="2147483651"/>
-              <ac:spMk id="2" creationId="{FF88E3BF-DDF0-8D7C-895C-9B850679344B}"/>
-            </ac:spMkLst>
-          </pc:spChg>
-          <pc:spChg chg="mod">
-            <ac:chgData name="Truong, Kimberly (she/her/hers)" userId="925efed1-480b-4601-a542-5efebb98d46d" providerId="ADAL" clId="{914C54CF-8645-4FB1-ACA4-FF32DA9EBB75}" dt="2024-04-16T20:34:21.537" v="263"/>
-            <ac:spMkLst>
-              <pc:docMk/>
-              <pc:sldMasterMk cId="3935980576" sldId="2147483648"/>
-              <pc:sldLayoutMk cId="3433536021" sldId="2147483651"/>
-              <ac:spMk id="3" creationId="{673B1B53-CDB1-950D-6C93-E9193A7AFCCC}"/>
-            </ac:spMkLst>
-          </pc:spChg>
-        </pc:sldLayoutChg>
-        <pc:sldLayoutChg chg="modSp">
-          <pc:chgData name="Truong, Kimberly (she/her/hers)" userId="925efed1-480b-4601-a542-5efebb98d46d" providerId="ADAL" clId="{914C54CF-8645-4FB1-ACA4-FF32DA9EBB75}" dt="2024-04-16T20:34:21.537" v="263"/>
-          <pc:sldLayoutMkLst>
-            <pc:docMk/>
-            <pc:sldMasterMk cId="3935980576" sldId="2147483648"/>
-            <pc:sldLayoutMk cId="230785183" sldId="2147483652"/>
-          </pc:sldLayoutMkLst>
-          <pc:spChg chg="mod">
-            <ac:chgData name="Truong, Kimberly (she/her/hers)" userId="925efed1-480b-4601-a542-5efebb98d46d" providerId="ADAL" clId="{914C54CF-8645-4FB1-ACA4-FF32DA9EBB75}" dt="2024-04-16T20:34:21.537" v="263"/>
-            <ac:spMkLst>
-              <pc:docMk/>
-              <pc:sldMasterMk cId="3935980576" sldId="2147483648"/>
-              <pc:sldLayoutMk cId="230785183" sldId="2147483652"/>
-              <ac:spMk id="3" creationId="{C834F3A0-32F0-623B-1C5D-EB30978E1337}"/>
-            </ac:spMkLst>
-          </pc:spChg>
-          <pc:spChg chg="mod">
-            <ac:chgData name="Truong, Kimberly (she/her/hers)" userId="925efed1-480b-4601-a542-5efebb98d46d" providerId="ADAL" clId="{914C54CF-8645-4FB1-ACA4-FF32DA9EBB75}" dt="2024-04-16T20:34:21.537" v="263"/>
-            <ac:spMkLst>
-              <pc:docMk/>
-              <pc:sldMasterMk cId="3935980576" sldId="2147483648"/>
-              <pc:sldLayoutMk cId="230785183" sldId="2147483652"/>
-              <ac:spMk id="4" creationId="{7543BD3D-8AE1-6961-932A-006261C868C3}"/>
-            </ac:spMkLst>
-          </pc:spChg>
-        </pc:sldLayoutChg>
-        <pc:sldLayoutChg chg="modSp">
-          <pc:chgData name="Truong, Kimberly (she/her/hers)" userId="925efed1-480b-4601-a542-5efebb98d46d" providerId="ADAL" clId="{914C54CF-8645-4FB1-ACA4-FF32DA9EBB75}" dt="2024-04-16T20:34:21.537" v="263"/>
-          <pc:sldLayoutMkLst>
-            <pc:docMk/>
-            <pc:sldMasterMk cId="3935980576" sldId="2147483648"/>
-            <pc:sldLayoutMk cId="2481720415" sldId="2147483653"/>
-          </pc:sldLayoutMkLst>
-          <pc:spChg chg="mod">
-            <ac:chgData name="Truong, Kimberly (she/her/hers)" userId="925efed1-480b-4601-a542-5efebb98d46d" providerId="ADAL" clId="{914C54CF-8645-4FB1-ACA4-FF32DA9EBB75}" dt="2024-04-16T20:34:21.537" v="263"/>
-            <ac:spMkLst>
-              <pc:docMk/>
-              <pc:sldMasterMk cId="3935980576" sldId="2147483648"/>
-              <pc:sldLayoutMk cId="2481720415" sldId="2147483653"/>
-              <ac:spMk id="2" creationId="{B3DE453C-114D-775C-BDFD-93EDEFE733B8}"/>
-            </ac:spMkLst>
-          </pc:spChg>
-          <pc:spChg chg="mod">
-            <ac:chgData name="Truong, Kimberly (she/her/hers)" userId="925efed1-480b-4601-a542-5efebb98d46d" providerId="ADAL" clId="{914C54CF-8645-4FB1-ACA4-FF32DA9EBB75}" dt="2024-04-16T20:34:21.537" v="263"/>
-            <ac:spMkLst>
-              <pc:docMk/>
-              <pc:sldMasterMk cId="3935980576" sldId="2147483648"/>
-              <pc:sldLayoutMk cId="2481720415" sldId="2147483653"/>
-              <ac:spMk id="3" creationId="{9D135616-292D-7662-1E6F-8D70088EBE46}"/>
-            </ac:spMkLst>
-          </pc:spChg>
-          <pc:spChg chg="mod">
-            <ac:chgData name="Truong, Kimberly (she/her/hers)" userId="925efed1-480b-4601-a542-5efebb98d46d" providerId="ADAL" clId="{914C54CF-8645-4FB1-ACA4-FF32DA9EBB75}" dt="2024-04-16T20:34:21.537" v="263"/>
-            <ac:spMkLst>
-              <pc:docMk/>
-              <pc:sldMasterMk cId="3935980576" sldId="2147483648"/>
-              <pc:sldLayoutMk cId="2481720415" sldId="2147483653"/>
-              <ac:spMk id="4" creationId="{B29C4A4B-AB3A-B757-0BA2-FE47490AF210}"/>
-            </ac:spMkLst>
-          </pc:spChg>
-          <pc:spChg chg="mod">
-            <ac:chgData name="Truong, Kimberly (she/her/hers)" userId="925efed1-480b-4601-a542-5efebb98d46d" providerId="ADAL" clId="{914C54CF-8645-4FB1-ACA4-FF32DA9EBB75}" dt="2024-04-16T20:34:21.537" v="263"/>
-            <ac:spMkLst>
-              <pc:docMk/>
-              <pc:sldMasterMk cId="3935980576" sldId="2147483648"/>
-              <pc:sldLayoutMk cId="2481720415" sldId="2147483653"/>
-              <ac:spMk id="5" creationId="{3E7D2B49-8FF3-1359-313A-72A0CCBB2909}"/>
-            </ac:spMkLst>
-          </pc:spChg>
-          <pc:spChg chg="mod">
-            <ac:chgData name="Truong, Kimberly (she/her/hers)" userId="925efed1-480b-4601-a542-5efebb98d46d" providerId="ADAL" clId="{914C54CF-8645-4FB1-ACA4-FF32DA9EBB75}" dt="2024-04-16T20:34:21.537" v="263"/>
-            <ac:spMkLst>
-              <pc:docMk/>
-              <pc:sldMasterMk cId="3935980576" sldId="2147483648"/>
-              <pc:sldLayoutMk cId="2481720415" sldId="2147483653"/>
-              <ac:spMk id="6" creationId="{B2B7C3D3-06FB-2C40-319A-DC097A0AF8AB}"/>
-            </ac:spMkLst>
-          </pc:spChg>
-        </pc:sldLayoutChg>
-        <pc:sldLayoutChg chg="modSp">
-          <pc:chgData name="Truong, Kimberly (she/her/hers)" userId="925efed1-480b-4601-a542-5efebb98d46d" providerId="ADAL" clId="{914C54CF-8645-4FB1-ACA4-FF32DA9EBB75}" dt="2024-04-16T20:34:21.537" v="263"/>
-          <pc:sldLayoutMkLst>
-            <pc:docMk/>
-            <pc:sldMasterMk cId="3935980576" sldId="2147483648"/>
-            <pc:sldLayoutMk cId="1248998746" sldId="2147483656"/>
-          </pc:sldLayoutMkLst>
-          <pc:spChg chg="mod">
-            <ac:chgData name="Truong, Kimberly (she/her/hers)" userId="925efed1-480b-4601-a542-5efebb98d46d" providerId="ADAL" clId="{914C54CF-8645-4FB1-ACA4-FF32DA9EBB75}" dt="2024-04-16T20:34:21.537" v="263"/>
-            <ac:spMkLst>
-              <pc:docMk/>
-              <pc:sldMasterMk cId="3935980576" sldId="2147483648"/>
-              <pc:sldLayoutMk cId="1248998746" sldId="2147483656"/>
-              <ac:spMk id="2" creationId="{E5799C40-6ADE-996A-8DD5-0D137428C33E}"/>
-            </ac:spMkLst>
-          </pc:spChg>
-          <pc:spChg chg="mod">
-            <ac:chgData name="Truong, Kimberly (she/her/hers)" userId="925efed1-480b-4601-a542-5efebb98d46d" providerId="ADAL" clId="{914C54CF-8645-4FB1-ACA4-FF32DA9EBB75}" dt="2024-04-16T20:34:21.537" v="263"/>
-            <ac:spMkLst>
-              <pc:docMk/>
-              <pc:sldMasterMk cId="3935980576" sldId="2147483648"/>
-              <pc:sldLayoutMk cId="1248998746" sldId="2147483656"/>
-              <ac:spMk id="3" creationId="{F44CC562-B036-1C4F-FA62-FC6AD476BB45}"/>
-            </ac:spMkLst>
-          </pc:spChg>
-          <pc:spChg chg="mod">
-            <ac:chgData name="Truong, Kimberly (she/her/hers)" userId="925efed1-480b-4601-a542-5efebb98d46d" providerId="ADAL" clId="{914C54CF-8645-4FB1-ACA4-FF32DA9EBB75}" dt="2024-04-16T20:34:21.537" v="263"/>
-            <ac:spMkLst>
-              <pc:docMk/>
-              <pc:sldMasterMk cId="3935980576" sldId="2147483648"/>
-              <pc:sldLayoutMk cId="1248998746" sldId="2147483656"/>
-              <ac:spMk id="4" creationId="{911FC02B-A3EA-233D-8003-772739743C18}"/>
-            </ac:spMkLst>
-          </pc:spChg>
-        </pc:sldLayoutChg>
-        <pc:sldLayoutChg chg="modSp">
-          <pc:chgData name="Truong, Kimberly (she/her/hers)" userId="925efed1-480b-4601-a542-5efebb98d46d" providerId="ADAL" clId="{914C54CF-8645-4FB1-ACA4-FF32DA9EBB75}" dt="2024-04-16T20:34:21.537" v="263"/>
-          <pc:sldLayoutMkLst>
-            <pc:docMk/>
-            <pc:sldMasterMk cId="3935980576" sldId="2147483648"/>
-            <pc:sldLayoutMk cId="4072083806" sldId="2147483657"/>
-          </pc:sldLayoutMkLst>
-          <pc:spChg chg="mod">
-            <ac:chgData name="Truong, Kimberly (she/her/hers)" userId="925efed1-480b-4601-a542-5efebb98d46d" providerId="ADAL" clId="{914C54CF-8645-4FB1-ACA4-FF32DA9EBB75}" dt="2024-04-16T20:34:21.537" v="263"/>
-            <ac:spMkLst>
-              <pc:docMk/>
-              <pc:sldMasterMk cId="3935980576" sldId="2147483648"/>
-              <pc:sldLayoutMk cId="4072083806" sldId="2147483657"/>
-              <ac:spMk id="2" creationId="{D50296A4-3922-66D2-39AB-038FB8777745}"/>
-            </ac:spMkLst>
-          </pc:spChg>
-          <pc:spChg chg="mod">
-            <ac:chgData name="Truong, Kimberly (she/her/hers)" userId="925efed1-480b-4601-a542-5efebb98d46d" providerId="ADAL" clId="{914C54CF-8645-4FB1-ACA4-FF32DA9EBB75}" dt="2024-04-16T20:34:21.537" v="263"/>
-            <ac:spMkLst>
-              <pc:docMk/>
-              <pc:sldMasterMk cId="3935980576" sldId="2147483648"/>
-              <pc:sldLayoutMk cId="4072083806" sldId="2147483657"/>
-              <ac:spMk id="3" creationId="{4AD31098-7006-819B-9148-2BB55093A5A2}"/>
-            </ac:spMkLst>
-          </pc:spChg>
-          <pc:spChg chg="mod">
-            <ac:chgData name="Truong, Kimberly (she/her/hers)" userId="925efed1-480b-4601-a542-5efebb98d46d" providerId="ADAL" clId="{914C54CF-8645-4FB1-ACA4-FF32DA9EBB75}" dt="2024-04-16T20:34:21.537" v="263"/>
-            <ac:spMkLst>
-              <pc:docMk/>
-              <pc:sldMasterMk cId="3935980576" sldId="2147483648"/>
-              <pc:sldLayoutMk cId="4072083806" sldId="2147483657"/>
-              <ac:spMk id="4" creationId="{16990F90-C228-55EC-436B-CD72F2A5FDAD}"/>
-            </ac:spMkLst>
-          </pc:spChg>
-        </pc:sldLayoutChg>
-        <pc:sldLayoutChg chg="modSp">
-          <pc:chgData name="Truong, Kimberly (she/her/hers)" userId="925efed1-480b-4601-a542-5efebb98d46d" providerId="ADAL" clId="{914C54CF-8645-4FB1-ACA4-FF32DA9EBB75}" dt="2024-04-16T20:34:21.537" v="263"/>
-          <pc:sldLayoutMkLst>
-            <pc:docMk/>
-            <pc:sldMasterMk cId="3935980576" sldId="2147483648"/>
-            <pc:sldLayoutMk cId="1785007827" sldId="2147483659"/>
-          </pc:sldLayoutMkLst>
-          <pc:spChg chg="mod">
-            <ac:chgData name="Truong, Kimberly (she/her/hers)" userId="925efed1-480b-4601-a542-5efebb98d46d" providerId="ADAL" clId="{914C54CF-8645-4FB1-ACA4-FF32DA9EBB75}" dt="2024-04-16T20:34:21.537" v="263"/>
-            <ac:spMkLst>
-              <pc:docMk/>
-              <pc:sldMasterMk cId="3935980576" sldId="2147483648"/>
-              <pc:sldLayoutMk cId="1785007827" sldId="2147483659"/>
-              <ac:spMk id="2" creationId="{BFBF93A4-5C72-14FB-78C2-83086FBC6519}"/>
-            </ac:spMkLst>
-          </pc:spChg>
-          <pc:spChg chg="mod">
-            <ac:chgData name="Truong, Kimberly (she/her/hers)" userId="925efed1-480b-4601-a542-5efebb98d46d" providerId="ADAL" clId="{914C54CF-8645-4FB1-ACA4-FF32DA9EBB75}" dt="2024-04-16T20:34:21.537" v="263"/>
-            <ac:spMkLst>
-              <pc:docMk/>
-              <pc:sldMasterMk cId="3935980576" sldId="2147483648"/>
-              <pc:sldLayoutMk cId="1785007827" sldId="2147483659"/>
-              <ac:spMk id="3" creationId="{FEC296D4-7A9E-9975-FF2A-C355FCAF7F77}"/>
-            </ac:spMkLst>
-          </pc:spChg>
-        </pc:sldLayoutChg>
-      </pc:sldMasterChg>
-    </pc:docChg>
-  </pc:docChgLst>
-  <pc:docChgLst>
-    <pc:chgData name="Truong, Kimberly (she/her/hers)" userId="925efed1-480b-4601-a542-5efebb98d46d" providerId="ADAL" clId="{8C2351D7-ABC9-448A-8649-757E848A3996}"/>
-    <pc:docChg chg="modSld">
-      <pc:chgData name="Truong, Kimberly (she/her/hers)" userId="925efed1-480b-4601-a542-5efebb98d46d" providerId="ADAL" clId="{8C2351D7-ABC9-448A-8649-757E848A3996}" dt="2024-08-21T20:45:26.489" v="74" actId="1038"/>
-      <pc:docMkLst>
-        <pc:docMk/>
-      </pc:docMkLst>
-      <pc:sldChg chg="modSp mod">
-        <pc:chgData name="Truong, Kimberly (she/her/hers)" userId="925efed1-480b-4601-a542-5efebb98d46d" providerId="ADAL" clId="{8C2351D7-ABC9-448A-8649-757E848A3996}" dt="2024-08-21T20:45:26.489" v="74" actId="1038"/>
-        <pc:sldMkLst>
-          <pc:docMk/>
-          <pc:sldMk cId="312177612" sldId="2969"/>
-        </pc:sldMkLst>
-        <pc:graphicFrameChg chg="mod modGraphic">
-          <ac:chgData name="Truong, Kimberly (she/her/hers)" userId="925efed1-480b-4601-a542-5efebb98d46d" providerId="ADAL" clId="{8C2351D7-ABC9-448A-8649-757E848A3996}" dt="2024-08-21T20:43:09.889" v="67" actId="1037"/>
-          <ac:graphicFrameMkLst>
-            <pc:docMk/>
-            <pc:sldMk cId="312177612" sldId="2969"/>
-            <ac:graphicFrameMk id="24" creationId="{EFF69940-0D6D-5518-442B-DBCC36EF3D3C}"/>
-          </ac:graphicFrameMkLst>
-        </pc:graphicFrameChg>
-        <pc:cxnChg chg="mod">
-          <ac:chgData name="Truong, Kimberly (she/her/hers)" userId="925efed1-480b-4601-a542-5efebb98d46d" providerId="ADAL" clId="{8C2351D7-ABC9-448A-8649-757E848A3996}" dt="2024-08-21T20:45:26.489" v="74" actId="1038"/>
-          <ac:cxnSpMkLst>
-            <pc:docMk/>
-            <pc:sldMk cId="312177612" sldId="2969"/>
-            <ac:cxnSpMk id="27" creationId="{38C2D6F6-3A28-4662-00C5-DC1BAB7FDF85}"/>
-          </ac:cxnSpMkLst>
-        </pc:cxnChg>
-        <pc:cxnChg chg="mod">
-          <ac:chgData name="Truong, Kimberly (she/her/hers)" userId="925efed1-480b-4601-a542-5efebb98d46d" providerId="ADAL" clId="{8C2351D7-ABC9-448A-8649-757E848A3996}" dt="2024-08-21T20:45:14.727" v="72" actId="554"/>
-          <ac:cxnSpMkLst>
-            <pc:docMk/>
-            <pc:sldMk cId="312177612" sldId="2969"/>
-            <ac:cxnSpMk id="54" creationId="{3BBF8B0A-2E95-52A1-961C-83528AB8C482}"/>
-          </ac:cxnSpMkLst>
-        </pc:cxnChg>
-        <pc:cxnChg chg="mod">
-          <ac:chgData name="Truong, Kimberly (she/her/hers)" userId="925efed1-480b-4601-a542-5efebb98d46d" providerId="ADAL" clId="{8C2351D7-ABC9-448A-8649-757E848A3996}" dt="2024-08-21T20:45:14.727" v="72" actId="554"/>
-          <ac:cxnSpMkLst>
-            <pc:docMk/>
-            <pc:sldMk cId="312177612" sldId="2969"/>
-            <ac:cxnSpMk id="55" creationId="{3B418017-20B6-193A-A4DE-4BDCD4EBDC26}"/>
-          </ac:cxnSpMkLst>
-        </pc:cxnChg>
-      </pc:sldChg>
-    </pc:docChg>
-  </pc:docChgLst>
-  <pc:docChgLst>
-    <pc:chgData name="Truong, Kimberly (she/her/hers)" userId="925efed1-480b-4601-a542-5efebb98d46d" providerId="ADAL" clId="{54DCFC8C-3FF4-4B07-84BF-6A7E0F716A71}"/>
-    <pc:docChg chg="modSld">
-      <pc:chgData name="Truong, Kimberly (she/her/hers)" userId="925efed1-480b-4601-a542-5efebb98d46d" providerId="ADAL" clId="{54DCFC8C-3FF4-4B07-84BF-6A7E0F716A71}" dt="2024-11-07T17:02:19.497" v="22" actId="20577"/>
-      <pc:docMkLst>
-        <pc:docMk/>
-      </pc:docMkLst>
-      <pc:sldChg chg="modSp mod">
-        <pc:chgData name="Truong, Kimberly (she/her/hers)" userId="925efed1-480b-4601-a542-5efebb98d46d" providerId="ADAL" clId="{54DCFC8C-3FF4-4B07-84BF-6A7E0F716A71}" dt="2024-11-07T17:02:19.497" v="22" actId="20577"/>
-        <pc:sldMkLst>
-          <pc:docMk/>
-          <pc:sldMk cId="312177612" sldId="2969"/>
-        </pc:sldMkLst>
-        <pc:spChg chg="mod">
-          <ac:chgData name="Truong, Kimberly (she/her/hers)" userId="925efed1-480b-4601-a542-5efebb98d46d" providerId="ADAL" clId="{54DCFC8C-3FF4-4B07-84BF-6A7E0F716A71}" dt="2024-11-07T17:01:30.785" v="20" actId="20577"/>
-          <ac:spMkLst>
-            <pc:docMk/>
-            <pc:sldMk cId="312177612" sldId="2969"/>
-            <ac:spMk id="21" creationId="{91236F16-7D03-A616-78BE-020B10C1213B}"/>
-          </ac:spMkLst>
-        </pc:spChg>
-        <pc:spChg chg="mod">
-          <ac:chgData name="Truong, Kimberly (she/her/hers)" userId="925efed1-480b-4601-a542-5efebb98d46d" providerId="ADAL" clId="{54DCFC8C-3FF4-4B07-84BF-6A7E0F716A71}" dt="2024-11-07T16:57:25.217" v="1" actId="20577"/>
-          <ac:spMkLst>
-            <pc:docMk/>
-            <pc:sldMk cId="312177612" sldId="2969"/>
-            <ac:spMk id="22" creationId="{1CF16134-8035-21CE-3EE6-ACE8B274FA65}"/>
-          </ac:spMkLst>
-        </pc:spChg>
-        <pc:spChg chg="mod">
-          <ac:chgData name="Truong, Kimberly (she/her/hers)" userId="925efed1-480b-4601-a542-5efebb98d46d" providerId="ADAL" clId="{54DCFC8C-3FF4-4B07-84BF-6A7E0F716A71}" dt="2024-11-07T17:00:39.533" v="15" actId="20577"/>
-          <ac:spMkLst>
-            <pc:docMk/>
-            <pc:sldMk cId="312177612" sldId="2969"/>
-            <ac:spMk id="23" creationId="{526748DC-44E9-4212-50E3-026AD11D55E9}"/>
-          </ac:spMkLst>
-        </pc:spChg>
-        <pc:spChg chg="mod">
-          <ac:chgData name="Truong, Kimberly (she/her/hers)" userId="925efed1-480b-4601-a542-5efebb98d46d" providerId="ADAL" clId="{54DCFC8C-3FF4-4B07-84BF-6A7E0F716A71}" dt="2024-11-07T17:02:19.497" v="22" actId="20577"/>
-          <ac:spMkLst>
-            <pc:docMk/>
-            <pc:sldMk cId="312177612" sldId="2969"/>
-            <ac:spMk id="40" creationId="{F14D9770-A517-F5A6-9A10-6319D6A5B643}"/>
-          </ac:spMkLst>
-        </pc:spChg>
-        <pc:spChg chg="mod">
-          <ac:chgData name="Truong, Kimberly (she/her/hers)" userId="925efed1-480b-4601-a542-5efebb98d46d" providerId="ADAL" clId="{54DCFC8C-3FF4-4B07-84BF-6A7E0F716A71}" dt="2024-11-07T17:01:03.535" v="17" actId="20577"/>
-          <ac:spMkLst>
-            <pc:docMk/>
-            <pc:sldMk cId="312177612" sldId="2969"/>
-            <ac:spMk id="57" creationId="{5C52125C-8ED8-7A5A-7DFD-C7FCDEED2B89}"/>
-          </ac:spMkLst>
-        </pc:spChg>
-      </pc:sldChg>
-    </pc:docChg>
-  </pc:docChgLst>
-</pc:chgInfo>
 </file>
 
 <file path=ppt/diagrams/colors1.xml><?xml version="1.0" encoding="utf-8"?>
@@ -4364,7 +3030,7 @@
           <a:p>
             <a:fld id="{CF3D3CB6-AF3F-41A8-820D-FF52D5A0F9BD}" type="datetimeFigureOut">
               <a:rPr lang="en-US" smtClean="0"/>
-              <a:t>11/7/2024</a:t>
+              <a:t>3/10/2025</a:t>
             </a:fld>
             <a:endParaRPr lang="en-US"/>
           </a:p>
@@ -4867,7 +3533,7 @@
           <a:p>
             <a:fld id="{5445729E-DEA5-4458-8279-F005B7149335}" type="datetimeFigureOut">
               <a:rPr lang="en-US" smtClean="0"/>
-              <a:t>11/7/2024</a:t>
+              <a:t>3/10/2025</a:t>
             </a:fld>
             <a:endParaRPr lang="en-US"/>
           </a:p>
@@ -5065,7 +3731,7 @@
           <a:p>
             <a:fld id="{5445729E-DEA5-4458-8279-F005B7149335}" type="datetimeFigureOut">
               <a:rPr lang="en-US" smtClean="0"/>
-              <a:t>11/7/2024</a:t>
+              <a:t>3/10/2025</a:t>
             </a:fld>
             <a:endParaRPr lang="en-US"/>
           </a:p>
@@ -5273,7 +3939,7 @@
           <a:p>
             <a:fld id="{5445729E-DEA5-4458-8279-F005B7149335}" type="datetimeFigureOut">
               <a:rPr lang="en-US" smtClean="0"/>
-              <a:t>11/7/2024</a:t>
+              <a:t>3/10/2025</a:t>
             </a:fld>
             <a:endParaRPr lang="en-US"/>
           </a:p>
@@ -5471,7 +4137,7 @@
           <a:p>
             <a:fld id="{5445729E-DEA5-4458-8279-F005B7149335}" type="datetimeFigureOut">
               <a:rPr lang="en-US" smtClean="0"/>
-              <a:t>11/7/2024</a:t>
+              <a:t>3/10/2025</a:t>
             </a:fld>
             <a:endParaRPr lang="en-US"/>
           </a:p>
@@ -5746,7 +4412,7 @@
           <a:p>
             <a:fld id="{5445729E-DEA5-4458-8279-F005B7149335}" type="datetimeFigureOut">
               <a:rPr lang="en-US" smtClean="0"/>
-              <a:t>11/7/2024</a:t>
+              <a:t>3/10/2025</a:t>
             </a:fld>
             <a:endParaRPr lang="en-US"/>
           </a:p>
@@ -6011,7 +4677,7 @@
           <a:p>
             <a:fld id="{5445729E-DEA5-4458-8279-F005B7149335}" type="datetimeFigureOut">
               <a:rPr lang="en-US" smtClean="0"/>
-              <a:t>11/7/2024</a:t>
+              <a:t>3/10/2025</a:t>
             </a:fld>
             <a:endParaRPr lang="en-US"/>
           </a:p>
@@ -6423,7 +5089,7 @@
           <a:p>
             <a:fld id="{5445729E-DEA5-4458-8279-F005B7149335}" type="datetimeFigureOut">
               <a:rPr lang="en-US" smtClean="0"/>
-              <a:t>11/7/2024</a:t>
+              <a:t>3/10/2025</a:t>
             </a:fld>
             <a:endParaRPr lang="en-US"/>
           </a:p>
@@ -6564,7 +5230,7 @@
           <a:p>
             <a:fld id="{5445729E-DEA5-4458-8279-F005B7149335}" type="datetimeFigureOut">
               <a:rPr lang="en-US" smtClean="0"/>
-              <a:t>11/7/2024</a:t>
+              <a:t>3/10/2025</a:t>
             </a:fld>
             <a:endParaRPr lang="en-US"/>
           </a:p>
@@ -6677,7 +5343,7 @@
           <a:p>
             <a:fld id="{5445729E-DEA5-4458-8279-F005B7149335}" type="datetimeFigureOut">
               <a:rPr lang="en-US" smtClean="0"/>
-              <a:t>11/7/2024</a:t>
+              <a:t>3/10/2025</a:t>
             </a:fld>
             <a:endParaRPr lang="en-US"/>
           </a:p>
@@ -6988,7 +5654,7 @@
           <a:p>
             <a:fld id="{5445729E-DEA5-4458-8279-F005B7149335}" type="datetimeFigureOut">
               <a:rPr lang="en-US" smtClean="0"/>
-              <a:t>11/7/2024</a:t>
+              <a:t>3/10/2025</a:t>
             </a:fld>
             <a:endParaRPr lang="en-US"/>
           </a:p>
@@ -7276,7 +5942,7 @@
           <a:p>
             <a:fld id="{5445729E-DEA5-4458-8279-F005B7149335}" type="datetimeFigureOut">
               <a:rPr lang="en-US" smtClean="0"/>
-              <a:t>11/7/2024</a:t>
+              <a:t>3/10/2025</a:t>
             </a:fld>
             <a:endParaRPr lang="en-US"/>
           </a:p>
@@ -7517,7 +6183,7 @@
           <a:p>
             <a:fld id="{5445729E-DEA5-4458-8279-F005B7149335}" type="datetimeFigureOut">
               <a:rPr lang="en-US" smtClean="0"/>
-              <a:t>11/7/2024</a:t>
+              <a:t>3/10/2025</a:t>
             </a:fld>
             <a:endParaRPr lang="en-US"/>
           </a:p>
@@ -8038,18 +6704,11 @@
           <a:lstStyle/>
           <a:p>
             <a:r>
-              <a:rPr lang="en-US" sz="1400">
-                <a:latin typeface="Avenir Next LT Pro" panose="020B0504020202020204" pitchFamily="34" charset="0"/>
-                <a:cs typeface="Calibri" panose="020F0502020204030204" pitchFamily="34" charset="0"/>
-              </a:rPr>
-              <a:t>22 </a:t>
-            </a:r>
-            <a:r>
               <a:rPr lang="en-US" sz="1400" dirty="0">
                 <a:latin typeface="Avenir Next LT Pro" panose="020B0504020202020204" pitchFamily="34" charset="0"/>
                 <a:cs typeface="Calibri" panose="020F0502020204030204" pitchFamily="34" charset="0"/>
               </a:rPr>
-              <a:t>chemicals with no </a:t>
+              <a:t>17 chemicals with no </a:t>
             </a:r>
             <a:r>
               <a:rPr lang="en-US" sz="1400" i="1" dirty="0">
@@ -8307,8 +6966,8 @@
         </p:nvSpPr>
         <p:spPr>
           <a:xfrm>
-            <a:off x="3695196" y="5218498"/>
-            <a:ext cx="1808974" cy="369332"/>
+            <a:off x="3722671" y="5218498"/>
+            <a:ext cx="1754024" cy="369332"/>
           </a:xfrm>
           <a:prstGeom prst="rect">
             <a:avLst/>
@@ -8351,7 +7010,7 @@
         </p:nvSpPr>
         <p:spPr>
           <a:xfrm>
-            <a:off x="6369050" y="5225777"/>
+            <a:off x="6369051" y="5225777"/>
             <a:ext cx="1594593" cy="338554"/>
           </a:xfrm>
           <a:prstGeom prst="rect">
@@ -8447,8 +7106,8 @@
         </p:nvSpPr>
         <p:spPr>
           <a:xfrm>
-            <a:off x="9027469" y="5225776"/>
-            <a:ext cx="1461819" cy="338554"/>
+            <a:off x="8902345" y="5225776"/>
+            <a:ext cx="1712066" cy="338554"/>
           </a:xfrm>
           <a:prstGeom prst="rect">
             <a:avLst/>
@@ -8465,7 +7124,7 @@
               <a:rPr lang="en-US" sz="1600" dirty="0">
                 <a:latin typeface="Avenir Next LT Pro" panose="020B0504020202020204" pitchFamily="34" charset="0"/>
               </a:rPr>
-              <a:t>98 Chemicals</a:t>
+              <a:t>103 Chemicals</a:t>
             </a:r>
           </a:p>
         </p:txBody>
@@ -8535,8 +7194,8 @@
         </p:nvSpPr>
         <p:spPr>
           <a:xfrm>
-            <a:off x="6037081" y="1930928"/>
-            <a:ext cx="2168766" cy="954107"/>
+            <a:off x="6037080" y="1930928"/>
+            <a:ext cx="2236289" cy="954107"/>
           </a:xfrm>
           <a:prstGeom prst="rect">
             <a:avLst/>

</xml_diff>